<commit_message>
formatting figures and combined full markdown doc with BayesAss markdown
</commit_message>
<xml_diff>
--- a/figures/structureplot_nsAdded.pptx
+++ b/figures/structureplot_nsAdded.pptx
@@ -6,6 +6,8 @@
   </p:sldMasterIdLst>
   <p:sldIdLst>
     <p:sldId id="256" r:id="rId2"/>
+    <p:sldId id="257" r:id="rId3"/>
+    <p:sldId id="258" r:id="rId4"/>
   </p:sldIdLst>
   <p:sldSz cx="12192000" cy="6858000"/>
   <p:notesSz cx="6858000" cy="9144000"/>
@@ -104,6 +106,11 @@
       </a:defRPr>
     </a:lvl9pPr>
   </p:defaultTextStyle>
+  <p:extLst>
+    <p:ext uri="{EFAFB233-063F-42B5-8137-9DF3F51BA10A}">
+      <p15:sldGuideLst xmlns:p15="http://schemas.microsoft.com/office/powerpoint/2012/main"/>
+    </p:ext>
+  </p:extLst>
 </p:presentation>
 </file>
 
@@ -254,7 +261,7 @@
           <a:p>
             <a:fld id="{9FA10170-A9EB-4B46-B059-190338426562}" type="datetimeFigureOut">
               <a:rPr lang="en-US" smtClean="0"/>
-              <a:t>2/8/2022</a:t>
+              <a:t>2/9/2022</a:t>
             </a:fld>
             <a:endParaRPr lang="en-US"/>
           </a:p>
@@ -452,7 +459,7 @@
           <a:p>
             <a:fld id="{9FA10170-A9EB-4B46-B059-190338426562}" type="datetimeFigureOut">
               <a:rPr lang="en-US" smtClean="0"/>
-              <a:t>2/8/2022</a:t>
+              <a:t>2/9/2022</a:t>
             </a:fld>
             <a:endParaRPr lang="en-US"/>
           </a:p>
@@ -660,7 +667,7 @@
           <a:p>
             <a:fld id="{9FA10170-A9EB-4B46-B059-190338426562}" type="datetimeFigureOut">
               <a:rPr lang="en-US" smtClean="0"/>
-              <a:t>2/8/2022</a:t>
+              <a:t>2/9/2022</a:t>
             </a:fld>
             <a:endParaRPr lang="en-US"/>
           </a:p>
@@ -858,7 +865,7 @@
           <a:p>
             <a:fld id="{9FA10170-A9EB-4B46-B059-190338426562}" type="datetimeFigureOut">
               <a:rPr lang="en-US" smtClean="0"/>
-              <a:t>2/8/2022</a:t>
+              <a:t>2/9/2022</a:t>
             </a:fld>
             <a:endParaRPr lang="en-US"/>
           </a:p>
@@ -1133,7 +1140,7 @@
           <a:p>
             <a:fld id="{9FA10170-A9EB-4B46-B059-190338426562}" type="datetimeFigureOut">
               <a:rPr lang="en-US" smtClean="0"/>
-              <a:t>2/8/2022</a:t>
+              <a:t>2/9/2022</a:t>
             </a:fld>
             <a:endParaRPr lang="en-US"/>
           </a:p>
@@ -1398,7 +1405,7 @@
           <a:p>
             <a:fld id="{9FA10170-A9EB-4B46-B059-190338426562}" type="datetimeFigureOut">
               <a:rPr lang="en-US" smtClean="0"/>
-              <a:t>2/8/2022</a:t>
+              <a:t>2/9/2022</a:t>
             </a:fld>
             <a:endParaRPr lang="en-US"/>
           </a:p>
@@ -1810,7 +1817,7 @@
           <a:p>
             <a:fld id="{9FA10170-A9EB-4B46-B059-190338426562}" type="datetimeFigureOut">
               <a:rPr lang="en-US" smtClean="0"/>
-              <a:t>2/8/2022</a:t>
+              <a:t>2/9/2022</a:t>
             </a:fld>
             <a:endParaRPr lang="en-US"/>
           </a:p>
@@ -1951,7 +1958,7 @@
           <a:p>
             <a:fld id="{9FA10170-A9EB-4B46-B059-190338426562}" type="datetimeFigureOut">
               <a:rPr lang="en-US" smtClean="0"/>
-              <a:t>2/8/2022</a:t>
+              <a:t>2/9/2022</a:t>
             </a:fld>
             <a:endParaRPr lang="en-US"/>
           </a:p>
@@ -2064,7 +2071,7 @@
           <a:p>
             <a:fld id="{9FA10170-A9EB-4B46-B059-190338426562}" type="datetimeFigureOut">
               <a:rPr lang="en-US" smtClean="0"/>
-              <a:t>2/8/2022</a:t>
+              <a:t>2/9/2022</a:t>
             </a:fld>
             <a:endParaRPr lang="en-US"/>
           </a:p>
@@ -2375,7 +2382,7 @@
           <a:p>
             <a:fld id="{9FA10170-A9EB-4B46-B059-190338426562}" type="datetimeFigureOut">
               <a:rPr lang="en-US" smtClean="0"/>
-              <a:t>2/8/2022</a:t>
+              <a:t>2/9/2022</a:t>
             </a:fld>
             <a:endParaRPr lang="en-US"/>
           </a:p>
@@ -2663,7 +2670,7 @@
           <a:p>
             <a:fld id="{9FA10170-A9EB-4B46-B059-190338426562}" type="datetimeFigureOut">
               <a:rPr lang="en-US" smtClean="0"/>
-              <a:t>2/8/2022</a:t>
+              <a:t>2/9/2022</a:t>
             </a:fld>
             <a:endParaRPr lang="en-US"/>
           </a:p>
@@ -2904,7 +2911,7 @@
           <a:p>
             <a:fld id="{9FA10170-A9EB-4B46-B059-190338426562}" type="datetimeFigureOut">
               <a:rPr lang="en-US" smtClean="0"/>
-              <a:t>2/8/2022</a:t>
+              <a:t>2/9/2022</a:t>
             </a:fld>
             <a:endParaRPr lang="en-US"/>
           </a:p>
@@ -3321,1305 +3328,3448 @@
           <a:chExt cx="0" cy="0"/>
         </a:xfrm>
       </p:grpSpPr>
-      <p:pic>
-        <p:nvPicPr>
-          <p:cNvPr id="5" name="Picture 4" descr="Chart, histogram&#10;&#10;Description automatically generated">
+      <p:grpSp>
+        <p:nvGrpSpPr>
+          <p:cNvPr id="2" name="Group 1">
             <a:extLst>
               <a:ext uri="{FF2B5EF4-FFF2-40B4-BE49-F238E27FC236}">
-                <a16:creationId xmlns:a16="http://schemas.microsoft.com/office/drawing/2014/main" id="{A3615187-428F-4CAC-8277-B15326CFD0BB}"/>
+                <a16:creationId xmlns:a16="http://schemas.microsoft.com/office/drawing/2014/main" id="{B2191382-993C-4BC2-B6B5-D82B963BDD01}"/>
               </a:ext>
             </a:extLst>
           </p:cNvPr>
-          <p:cNvPicPr>
-            <a:picLocks noChangeAspect="1"/>
-          </p:cNvPicPr>
+          <p:cNvGrpSpPr/>
           <p:nvPr/>
-        </p:nvPicPr>
-        <p:blipFill rotWithShape="1">
-          <a:blip r:embed="rId2">
-            <a:extLst>
-              <a:ext uri="{28A0092B-C50C-407E-A947-70E740481C1C}">
-                <a14:useLocalDpi xmlns:a14="http://schemas.microsoft.com/office/drawing/2010/main" val="0"/>
-              </a:ext>
-            </a:extLst>
-          </a:blip>
-          <a:srcRect t="12873"/>
-          <a:stretch/>
-        </p:blipFill>
-        <p:spPr>
+        </p:nvGrpSpPr>
+        <p:grpSpPr>
           <a:xfrm>
-            <a:off x="607262" y="1790436"/>
-            <a:ext cx="11290341" cy="3277127"/>
+            <a:off x="607262" y="1497981"/>
+            <a:ext cx="11290341" cy="3569582"/>
+            <a:chOff x="607262" y="1497981"/>
+            <a:chExt cx="11290341" cy="3569582"/>
           </a:xfrm>
-          <a:prstGeom prst="rect">
-            <a:avLst/>
-          </a:prstGeom>
-        </p:spPr>
-      </p:pic>
-      <p:sp>
-        <p:nvSpPr>
-          <p:cNvPr id="6" name="TextBox 5">
-            <a:extLst>
-              <a:ext uri="{FF2B5EF4-FFF2-40B4-BE49-F238E27FC236}">
-                <a16:creationId xmlns:a16="http://schemas.microsoft.com/office/drawing/2014/main" id="{AE640E3A-58EC-4119-B092-4DFC8E2073FB}"/>
-              </a:ext>
-            </a:extLst>
-          </p:cNvPr>
-          <p:cNvSpPr txBox="1"/>
-          <p:nvPr/>
-        </p:nvSpPr>
-        <p:spPr>
-          <a:xfrm>
-            <a:off x="872935" y="1497981"/>
-            <a:ext cx="231227" cy="371539"/>
-          </a:xfrm>
-          <a:prstGeom prst="rect">
-            <a:avLst/>
-          </a:prstGeom>
-          <a:noFill/>
-        </p:spPr>
-        <p:txBody>
-          <a:bodyPr wrap="square" rtlCol="0">
-            <a:spAutoFit/>
-          </a:bodyPr>
-          <a:lstStyle/>
-          <a:p>
-            <a:r>
-              <a:rPr lang="en-US" dirty="0"/>
-              <a:t>8</a:t>
-            </a:r>
-          </a:p>
-        </p:txBody>
-      </p:sp>
-      <p:sp>
-        <p:nvSpPr>
-          <p:cNvPr id="7" name="TextBox 6">
-            <a:extLst>
-              <a:ext uri="{FF2B5EF4-FFF2-40B4-BE49-F238E27FC236}">
-                <a16:creationId xmlns:a16="http://schemas.microsoft.com/office/drawing/2014/main" id="{E089C40A-676F-44B6-9800-D307CFA19B22}"/>
-              </a:ext>
-            </a:extLst>
-          </p:cNvPr>
-          <p:cNvSpPr txBox="1"/>
-          <p:nvPr/>
-        </p:nvSpPr>
-        <p:spPr>
-          <a:xfrm>
-            <a:off x="1098800" y="1485636"/>
-            <a:ext cx="520071" cy="369332"/>
-          </a:xfrm>
-          <a:prstGeom prst="rect">
-            <a:avLst/>
-          </a:prstGeom>
-          <a:noFill/>
-        </p:spPr>
-        <p:txBody>
-          <a:bodyPr wrap="square" rtlCol="0">
-            <a:spAutoFit/>
-          </a:bodyPr>
-          <a:lstStyle/>
-          <a:p>
-            <a:r>
-              <a:rPr lang="en-US" dirty="0"/>
-              <a:t>20</a:t>
-            </a:r>
-          </a:p>
-        </p:txBody>
-      </p:sp>
-      <p:sp>
-        <p:nvSpPr>
-          <p:cNvPr id="8" name="TextBox 7">
-            <a:extLst>
-              <a:ext uri="{FF2B5EF4-FFF2-40B4-BE49-F238E27FC236}">
-                <a16:creationId xmlns:a16="http://schemas.microsoft.com/office/drawing/2014/main" id="{F242D657-9634-45E2-8D70-7B5E0179791E}"/>
-              </a:ext>
-            </a:extLst>
-          </p:cNvPr>
-          <p:cNvSpPr txBox="1"/>
-          <p:nvPr/>
-        </p:nvSpPr>
-        <p:spPr>
-          <a:xfrm>
-            <a:off x="1459771" y="1494303"/>
-            <a:ext cx="231227" cy="371539"/>
-          </a:xfrm>
-          <a:prstGeom prst="rect">
-            <a:avLst/>
-          </a:prstGeom>
-          <a:noFill/>
-        </p:spPr>
-        <p:txBody>
-          <a:bodyPr wrap="square" rtlCol="0">
-            <a:spAutoFit/>
-          </a:bodyPr>
-          <a:lstStyle/>
-          <a:p>
-            <a:r>
-              <a:rPr lang="en-US" dirty="0"/>
-              <a:t>6</a:t>
-            </a:r>
-          </a:p>
-        </p:txBody>
-      </p:sp>
-      <p:sp>
-        <p:nvSpPr>
-          <p:cNvPr id="9" name="TextBox 8">
-            <a:extLst>
-              <a:ext uri="{FF2B5EF4-FFF2-40B4-BE49-F238E27FC236}">
-                <a16:creationId xmlns:a16="http://schemas.microsoft.com/office/drawing/2014/main" id="{453AAB2B-57AD-4EE9-87C1-6371111E8A13}"/>
-              </a:ext>
-            </a:extLst>
-          </p:cNvPr>
-          <p:cNvSpPr txBox="1"/>
-          <p:nvPr/>
-        </p:nvSpPr>
-        <p:spPr>
-          <a:xfrm>
-            <a:off x="2162211" y="1429409"/>
-            <a:ext cx="231227" cy="371539"/>
-          </a:xfrm>
-          <a:prstGeom prst="rect">
-            <a:avLst/>
-          </a:prstGeom>
-          <a:noFill/>
-        </p:spPr>
-        <p:txBody>
-          <a:bodyPr wrap="square" rtlCol="0">
-            <a:spAutoFit/>
-          </a:bodyPr>
-          <a:lstStyle/>
-          <a:p>
-            <a:r>
-              <a:rPr lang="en-US" dirty="0"/>
-              <a:t>1</a:t>
-            </a:r>
-          </a:p>
-        </p:txBody>
-      </p:sp>
-      <p:sp>
-        <p:nvSpPr>
-          <p:cNvPr id="10" name="TextBox 9">
-            <a:extLst>
-              <a:ext uri="{FF2B5EF4-FFF2-40B4-BE49-F238E27FC236}">
-                <a16:creationId xmlns:a16="http://schemas.microsoft.com/office/drawing/2014/main" id="{1508B414-ACE3-4905-B545-C20ED5FBA9FB}"/>
-              </a:ext>
-            </a:extLst>
-          </p:cNvPr>
-          <p:cNvSpPr txBox="1"/>
-          <p:nvPr/>
-        </p:nvSpPr>
-        <p:spPr>
-          <a:xfrm>
-            <a:off x="1860332" y="1439920"/>
-            <a:ext cx="231227" cy="371539"/>
-          </a:xfrm>
-          <a:prstGeom prst="rect">
-            <a:avLst/>
-          </a:prstGeom>
-          <a:noFill/>
-        </p:spPr>
-        <p:txBody>
-          <a:bodyPr wrap="square" rtlCol="0">
-            <a:spAutoFit/>
-          </a:bodyPr>
-          <a:lstStyle/>
-          <a:p>
-            <a:r>
-              <a:rPr lang="en-US" dirty="0"/>
-              <a:t>1</a:t>
-            </a:r>
-          </a:p>
-        </p:txBody>
-      </p:sp>
-      <p:sp>
-        <p:nvSpPr>
-          <p:cNvPr id="11" name="TextBox 10">
-            <a:extLst>
-              <a:ext uri="{FF2B5EF4-FFF2-40B4-BE49-F238E27FC236}">
-                <a16:creationId xmlns:a16="http://schemas.microsoft.com/office/drawing/2014/main" id="{70C0EF47-76FB-4C32-8869-B2CCE5D60D3A}"/>
-              </a:ext>
-            </a:extLst>
-          </p:cNvPr>
-          <p:cNvSpPr txBox="1"/>
-          <p:nvPr/>
-        </p:nvSpPr>
-        <p:spPr>
-          <a:xfrm>
-            <a:off x="2737069" y="1460943"/>
-            <a:ext cx="231227" cy="371539"/>
-          </a:xfrm>
-          <a:prstGeom prst="rect">
-            <a:avLst/>
-          </a:prstGeom>
-          <a:noFill/>
-        </p:spPr>
-        <p:txBody>
-          <a:bodyPr wrap="square" rtlCol="0">
-            <a:spAutoFit/>
-          </a:bodyPr>
-          <a:lstStyle/>
-          <a:p>
-            <a:r>
-              <a:rPr lang="en-US" dirty="0"/>
-              <a:t>1</a:t>
-            </a:r>
-          </a:p>
-        </p:txBody>
-      </p:sp>
-      <p:sp>
-        <p:nvSpPr>
-          <p:cNvPr id="12" name="TextBox 11">
-            <a:extLst>
-              <a:ext uri="{FF2B5EF4-FFF2-40B4-BE49-F238E27FC236}">
-                <a16:creationId xmlns:a16="http://schemas.microsoft.com/office/drawing/2014/main" id="{8B27411F-765F-42CB-8AD0-82B364E732EC}"/>
-              </a:ext>
-            </a:extLst>
-          </p:cNvPr>
-          <p:cNvSpPr txBox="1"/>
-          <p:nvPr/>
-        </p:nvSpPr>
-        <p:spPr>
-          <a:xfrm>
-            <a:off x="2450953" y="1460943"/>
-            <a:ext cx="231227" cy="371539"/>
-          </a:xfrm>
-          <a:prstGeom prst="rect">
-            <a:avLst/>
-          </a:prstGeom>
-          <a:noFill/>
-        </p:spPr>
-        <p:txBody>
-          <a:bodyPr wrap="square" rtlCol="0">
-            <a:spAutoFit/>
-          </a:bodyPr>
-          <a:lstStyle/>
-          <a:p>
-            <a:r>
-              <a:rPr lang="en-US" dirty="0"/>
-              <a:t>3</a:t>
-            </a:r>
-          </a:p>
-        </p:txBody>
-      </p:sp>
-      <p:sp>
-        <p:nvSpPr>
-          <p:cNvPr id="13" name="TextBox 12">
-            <a:extLst>
-              <a:ext uri="{FF2B5EF4-FFF2-40B4-BE49-F238E27FC236}">
-                <a16:creationId xmlns:a16="http://schemas.microsoft.com/office/drawing/2014/main" id="{A4DB1905-B680-4685-8EEA-5B7DB320121C}"/>
-              </a:ext>
-            </a:extLst>
-          </p:cNvPr>
-          <p:cNvSpPr txBox="1"/>
-          <p:nvPr/>
-        </p:nvSpPr>
-        <p:spPr>
-          <a:xfrm>
-            <a:off x="3020848" y="1460943"/>
-            <a:ext cx="231227" cy="371539"/>
-          </a:xfrm>
-          <a:prstGeom prst="rect">
-            <a:avLst/>
-          </a:prstGeom>
-          <a:noFill/>
-        </p:spPr>
-        <p:txBody>
-          <a:bodyPr wrap="square" rtlCol="0">
-            <a:spAutoFit/>
-          </a:bodyPr>
-          <a:lstStyle/>
-          <a:p>
-            <a:r>
-              <a:rPr lang="en-US" dirty="0"/>
-              <a:t>1</a:t>
-            </a:r>
-          </a:p>
-        </p:txBody>
-      </p:sp>
-      <p:sp>
-        <p:nvSpPr>
-          <p:cNvPr id="14" name="TextBox 13">
-            <a:extLst>
-              <a:ext uri="{FF2B5EF4-FFF2-40B4-BE49-F238E27FC236}">
-                <a16:creationId xmlns:a16="http://schemas.microsoft.com/office/drawing/2014/main" id="{652B862E-4C84-49EC-AF59-B47892B65F53}"/>
-              </a:ext>
-            </a:extLst>
-          </p:cNvPr>
-          <p:cNvSpPr txBox="1"/>
-          <p:nvPr/>
-        </p:nvSpPr>
-        <p:spPr>
-          <a:xfrm>
-            <a:off x="3283314" y="1460943"/>
-            <a:ext cx="231227" cy="371539"/>
-          </a:xfrm>
-          <a:prstGeom prst="rect">
-            <a:avLst/>
-          </a:prstGeom>
-          <a:noFill/>
-        </p:spPr>
-        <p:txBody>
-          <a:bodyPr wrap="square" rtlCol="0">
-            <a:spAutoFit/>
-          </a:bodyPr>
-          <a:lstStyle/>
-          <a:p>
-            <a:r>
-              <a:rPr lang="en-US" dirty="0"/>
-              <a:t>1</a:t>
-            </a:r>
-          </a:p>
-        </p:txBody>
-      </p:sp>
-      <p:sp>
-        <p:nvSpPr>
-          <p:cNvPr id="15" name="TextBox 14">
-            <a:extLst>
-              <a:ext uri="{FF2B5EF4-FFF2-40B4-BE49-F238E27FC236}">
-                <a16:creationId xmlns:a16="http://schemas.microsoft.com/office/drawing/2014/main" id="{CC2BA1B4-62D6-4922-9D4E-BE3FEE691E54}"/>
-              </a:ext>
-            </a:extLst>
-          </p:cNvPr>
-          <p:cNvSpPr txBox="1"/>
-          <p:nvPr/>
-        </p:nvSpPr>
-        <p:spPr>
-          <a:xfrm>
-            <a:off x="3588114" y="1462779"/>
-            <a:ext cx="231227" cy="371539"/>
-          </a:xfrm>
-          <a:prstGeom prst="rect">
-            <a:avLst/>
-          </a:prstGeom>
-          <a:noFill/>
-        </p:spPr>
-        <p:txBody>
-          <a:bodyPr wrap="square" rtlCol="0">
-            <a:spAutoFit/>
-          </a:bodyPr>
-          <a:lstStyle/>
-          <a:p>
-            <a:r>
-              <a:rPr lang="en-US" dirty="0"/>
-              <a:t>1</a:t>
-            </a:r>
-          </a:p>
-        </p:txBody>
-      </p:sp>
-      <p:sp>
-        <p:nvSpPr>
-          <p:cNvPr id="16" name="TextBox 15">
-            <a:extLst>
-              <a:ext uri="{FF2B5EF4-FFF2-40B4-BE49-F238E27FC236}">
-                <a16:creationId xmlns:a16="http://schemas.microsoft.com/office/drawing/2014/main" id="{FDA8688B-23B2-4809-9956-EAE5D06FA7FB}"/>
-              </a:ext>
-            </a:extLst>
-          </p:cNvPr>
-          <p:cNvSpPr txBox="1"/>
-          <p:nvPr/>
-        </p:nvSpPr>
-        <p:spPr>
-          <a:xfrm>
-            <a:off x="4155380" y="1466193"/>
-            <a:ext cx="231227" cy="371539"/>
-          </a:xfrm>
-          <a:prstGeom prst="rect">
-            <a:avLst/>
-          </a:prstGeom>
-          <a:noFill/>
-        </p:spPr>
-        <p:txBody>
-          <a:bodyPr wrap="square" rtlCol="0">
-            <a:spAutoFit/>
-          </a:bodyPr>
-          <a:lstStyle/>
-          <a:p>
-            <a:r>
-              <a:rPr lang="en-US" dirty="0"/>
-              <a:t>5</a:t>
-            </a:r>
-          </a:p>
-        </p:txBody>
-      </p:sp>
-      <p:sp>
-        <p:nvSpPr>
-          <p:cNvPr id="17" name="TextBox 16">
-            <a:extLst>
-              <a:ext uri="{FF2B5EF4-FFF2-40B4-BE49-F238E27FC236}">
-                <a16:creationId xmlns:a16="http://schemas.microsoft.com/office/drawing/2014/main" id="{844766E1-FAA2-43C5-A630-6A563C4C5A4E}"/>
-              </a:ext>
-            </a:extLst>
-          </p:cNvPr>
-          <p:cNvSpPr txBox="1"/>
-          <p:nvPr/>
-        </p:nvSpPr>
-        <p:spPr>
-          <a:xfrm>
-            <a:off x="3850580" y="1483798"/>
-            <a:ext cx="231227" cy="371539"/>
-          </a:xfrm>
-          <a:prstGeom prst="rect">
-            <a:avLst/>
-          </a:prstGeom>
-          <a:noFill/>
-        </p:spPr>
-        <p:txBody>
-          <a:bodyPr wrap="square" rtlCol="0">
-            <a:spAutoFit/>
-          </a:bodyPr>
-          <a:lstStyle/>
-          <a:p>
-            <a:r>
-              <a:rPr lang="en-US" dirty="0"/>
-              <a:t>1</a:t>
-            </a:r>
-          </a:p>
-        </p:txBody>
-      </p:sp>
-      <p:sp>
-        <p:nvSpPr>
-          <p:cNvPr id="18" name="TextBox 17">
-            <a:extLst>
-              <a:ext uri="{FF2B5EF4-FFF2-40B4-BE49-F238E27FC236}">
-                <a16:creationId xmlns:a16="http://schemas.microsoft.com/office/drawing/2014/main" id="{7E4037F1-3BDC-4AED-A768-1F9F454A6BE4}"/>
-              </a:ext>
-            </a:extLst>
-          </p:cNvPr>
-          <p:cNvSpPr txBox="1"/>
-          <p:nvPr/>
-        </p:nvSpPr>
-        <p:spPr>
-          <a:xfrm>
-            <a:off x="4470110" y="1483797"/>
-            <a:ext cx="231227" cy="371539"/>
-          </a:xfrm>
-          <a:prstGeom prst="rect">
-            <a:avLst/>
-          </a:prstGeom>
-          <a:noFill/>
-        </p:spPr>
-        <p:txBody>
-          <a:bodyPr wrap="square" rtlCol="0">
-            <a:spAutoFit/>
-          </a:bodyPr>
-          <a:lstStyle/>
-          <a:p>
-            <a:r>
-              <a:rPr lang="en-US" dirty="0"/>
-              <a:t>1</a:t>
-            </a:r>
-          </a:p>
-        </p:txBody>
-      </p:sp>
-      <p:sp>
-        <p:nvSpPr>
-          <p:cNvPr id="19" name="TextBox 18">
-            <a:extLst>
-              <a:ext uri="{FF2B5EF4-FFF2-40B4-BE49-F238E27FC236}">
-                <a16:creationId xmlns:a16="http://schemas.microsoft.com/office/drawing/2014/main" id="{08A7D3C4-9E13-4C21-B68C-0F9437AF0D4B}"/>
-              </a:ext>
-            </a:extLst>
-          </p:cNvPr>
-          <p:cNvSpPr txBox="1"/>
-          <p:nvPr/>
-        </p:nvSpPr>
-        <p:spPr>
-          <a:xfrm>
-            <a:off x="4830379" y="1496145"/>
-            <a:ext cx="231227" cy="371539"/>
-          </a:xfrm>
-          <a:prstGeom prst="rect">
-            <a:avLst/>
-          </a:prstGeom>
-          <a:noFill/>
-        </p:spPr>
-        <p:txBody>
-          <a:bodyPr wrap="square" rtlCol="0">
-            <a:spAutoFit/>
-          </a:bodyPr>
-          <a:lstStyle/>
-          <a:p>
-            <a:r>
-              <a:rPr lang="en-US" dirty="0"/>
-              <a:t>1</a:t>
-            </a:r>
-          </a:p>
-        </p:txBody>
-      </p:sp>
-      <p:sp>
-        <p:nvSpPr>
-          <p:cNvPr id="20" name="TextBox 19">
-            <a:extLst>
-              <a:ext uri="{FF2B5EF4-FFF2-40B4-BE49-F238E27FC236}">
-                <a16:creationId xmlns:a16="http://schemas.microsoft.com/office/drawing/2014/main" id="{9A9EAE77-59B0-4F1F-B4FD-956439962202}"/>
-              </a:ext>
-            </a:extLst>
-          </p:cNvPr>
-          <p:cNvSpPr txBox="1"/>
-          <p:nvPr/>
-        </p:nvSpPr>
-        <p:spPr>
-          <a:xfrm>
-            <a:off x="5149580" y="1494306"/>
-            <a:ext cx="231227" cy="371539"/>
-          </a:xfrm>
-          <a:prstGeom prst="rect">
-            <a:avLst/>
-          </a:prstGeom>
-          <a:noFill/>
-        </p:spPr>
-        <p:txBody>
-          <a:bodyPr wrap="square" rtlCol="0">
-            <a:spAutoFit/>
-          </a:bodyPr>
-          <a:lstStyle/>
-          <a:p>
-            <a:r>
-              <a:rPr lang="en-US" dirty="0"/>
-              <a:t>1</a:t>
-            </a:r>
-          </a:p>
-        </p:txBody>
-      </p:sp>
-      <p:sp>
-        <p:nvSpPr>
-          <p:cNvPr id="21" name="TextBox 20">
-            <a:extLst>
-              <a:ext uri="{FF2B5EF4-FFF2-40B4-BE49-F238E27FC236}">
-                <a16:creationId xmlns:a16="http://schemas.microsoft.com/office/drawing/2014/main" id="{F93FCA14-80C8-4087-93D1-38322C3B01F8}"/>
-              </a:ext>
-            </a:extLst>
-          </p:cNvPr>
-          <p:cNvSpPr txBox="1"/>
-          <p:nvPr/>
-        </p:nvSpPr>
-        <p:spPr>
-          <a:xfrm>
-            <a:off x="5394727" y="1483797"/>
-            <a:ext cx="231227" cy="371539"/>
-          </a:xfrm>
-          <a:prstGeom prst="rect">
-            <a:avLst/>
-          </a:prstGeom>
-          <a:noFill/>
-        </p:spPr>
-        <p:txBody>
-          <a:bodyPr wrap="square" rtlCol="0">
-            <a:spAutoFit/>
-          </a:bodyPr>
-          <a:lstStyle/>
-          <a:p>
-            <a:r>
-              <a:rPr lang="en-US" dirty="0"/>
-              <a:t>2</a:t>
-            </a:r>
-          </a:p>
-        </p:txBody>
-      </p:sp>
-      <p:sp>
-        <p:nvSpPr>
-          <p:cNvPr id="22" name="TextBox 21">
-            <a:extLst>
-              <a:ext uri="{FF2B5EF4-FFF2-40B4-BE49-F238E27FC236}">
-                <a16:creationId xmlns:a16="http://schemas.microsoft.com/office/drawing/2014/main" id="{8C7F9BB6-D7BE-4F25-B597-104EA57B653E}"/>
-              </a:ext>
-            </a:extLst>
-          </p:cNvPr>
-          <p:cNvSpPr txBox="1"/>
-          <p:nvPr/>
-        </p:nvSpPr>
-        <p:spPr>
-          <a:xfrm>
-            <a:off x="5717921" y="1466193"/>
-            <a:ext cx="231227" cy="371539"/>
-          </a:xfrm>
-          <a:prstGeom prst="rect">
-            <a:avLst/>
-          </a:prstGeom>
-          <a:noFill/>
-        </p:spPr>
-        <p:txBody>
-          <a:bodyPr wrap="square" rtlCol="0">
-            <a:spAutoFit/>
-          </a:bodyPr>
-          <a:lstStyle/>
-          <a:p>
-            <a:r>
-              <a:rPr lang="en-US" dirty="0"/>
-              <a:t>1</a:t>
-            </a:r>
-          </a:p>
-        </p:txBody>
-      </p:sp>
-      <p:sp>
-        <p:nvSpPr>
-          <p:cNvPr id="23" name="TextBox 22">
-            <a:extLst>
-              <a:ext uri="{FF2B5EF4-FFF2-40B4-BE49-F238E27FC236}">
-                <a16:creationId xmlns:a16="http://schemas.microsoft.com/office/drawing/2014/main" id="{CA0BE5FA-7733-4748-B8CF-215109C3C8A6}"/>
-              </a:ext>
-            </a:extLst>
-          </p:cNvPr>
-          <p:cNvSpPr txBox="1"/>
-          <p:nvPr/>
-        </p:nvSpPr>
-        <p:spPr>
-          <a:xfrm>
-            <a:off x="5995075" y="1466193"/>
-            <a:ext cx="231227" cy="371539"/>
-          </a:xfrm>
-          <a:prstGeom prst="rect">
-            <a:avLst/>
-          </a:prstGeom>
-          <a:noFill/>
-        </p:spPr>
-        <p:txBody>
-          <a:bodyPr wrap="square" rtlCol="0">
-            <a:spAutoFit/>
-          </a:bodyPr>
-          <a:lstStyle/>
-          <a:p>
-            <a:r>
-              <a:rPr lang="en-US" dirty="0"/>
-              <a:t>1</a:t>
-            </a:r>
-          </a:p>
-        </p:txBody>
-      </p:sp>
-      <p:sp>
-        <p:nvSpPr>
-          <p:cNvPr id="24" name="TextBox 23">
-            <a:extLst>
-              <a:ext uri="{FF2B5EF4-FFF2-40B4-BE49-F238E27FC236}">
-                <a16:creationId xmlns:a16="http://schemas.microsoft.com/office/drawing/2014/main" id="{912D7C63-7B8B-48F7-B2BF-45BD1C6E265F}"/>
-              </a:ext>
-            </a:extLst>
-          </p:cNvPr>
-          <p:cNvSpPr txBox="1"/>
-          <p:nvPr/>
-        </p:nvSpPr>
-        <p:spPr>
-          <a:xfrm>
-            <a:off x="11440512" y="1424941"/>
-            <a:ext cx="231227" cy="371539"/>
-          </a:xfrm>
-          <a:prstGeom prst="rect">
-            <a:avLst/>
-          </a:prstGeom>
-          <a:noFill/>
-        </p:spPr>
-        <p:txBody>
-          <a:bodyPr wrap="square" rtlCol="0">
-            <a:spAutoFit/>
-          </a:bodyPr>
-          <a:lstStyle/>
-          <a:p>
-            <a:r>
-              <a:rPr lang="en-US" dirty="0"/>
-              <a:t>1</a:t>
-            </a:r>
-          </a:p>
-        </p:txBody>
-      </p:sp>
-      <p:sp>
-        <p:nvSpPr>
-          <p:cNvPr id="25" name="TextBox 24">
-            <a:extLst>
-              <a:ext uri="{FF2B5EF4-FFF2-40B4-BE49-F238E27FC236}">
-                <a16:creationId xmlns:a16="http://schemas.microsoft.com/office/drawing/2014/main" id="{E4480204-175F-4047-8AB0-A57610CED8A3}"/>
-              </a:ext>
-            </a:extLst>
-          </p:cNvPr>
-          <p:cNvSpPr txBox="1"/>
-          <p:nvPr/>
-        </p:nvSpPr>
-        <p:spPr>
-          <a:xfrm>
-            <a:off x="9974521" y="1494304"/>
-            <a:ext cx="231227" cy="371539"/>
-          </a:xfrm>
-          <a:prstGeom prst="rect">
-            <a:avLst/>
-          </a:prstGeom>
-          <a:noFill/>
-        </p:spPr>
-        <p:txBody>
-          <a:bodyPr wrap="square" rtlCol="0">
-            <a:spAutoFit/>
-          </a:bodyPr>
-          <a:lstStyle/>
-          <a:p>
-            <a:r>
-              <a:rPr lang="en-US" dirty="0"/>
-              <a:t>1</a:t>
-            </a:r>
-          </a:p>
-        </p:txBody>
-      </p:sp>
-      <p:sp>
-        <p:nvSpPr>
-          <p:cNvPr id="26" name="TextBox 25">
-            <a:extLst>
-              <a:ext uri="{FF2B5EF4-FFF2-40B4-BE49-F238E27FC236}">
-                <a16:creationId xmlns:a16="http://schemas.microsoft.com/office/drawing/2014/main" id="{08514154-F255-427F-8A7B-0327047B78AD}"/>
-              </a:ext>
-            </a:extLst>
-          </p:cNvPr>
-          <p:cNvSpPr txBox="1"/>
-          <p:nvPr/>
-        </p:nvSpPr>
-        <p:spPr>
-          <a:xfrm>
-            <a:off x="10239997" y="1456601"/>
-            <a:ext cx="231227" cy="371539"/>
-          </a:xfrm>
-          <a:prstGeom prst="rect">
-            <a:avLst/>
-          </a:prstGeom>
-          <a:noFill/>
-        </p:spPr>
-        <p:txBody>
-          <a:bodyPr wrap="square" rtlCol="0">
-            <a:spAutoFit/>
-          </a:bodyPr>
-          <a:lstStyle/>
-          <a:p>
-            <a:r>
-              <a:rPr lang="en-US" dirty="0"/>
-              <a:t>1</a:t>
-            </a:r>
-          </a:p>
-        </p:txBody>
-      </p:sp>
-      <p:sp>
-        <p:nvSpPr>
-          <p:cNvPr id="27" name="TextBox 26">
-            <a:extLst>
-              <a:ext uri="{FF2B5EF4-FFF2-40B4-BE49-F238E27FC236}">
-                <a16:creationId xmlns:a16="http://schemas.microsoft.com/office/drawing/2014/main" id="{1F719E16-7A4D-4E99-92C6-1E1F0A6D15CD}"/>
-              </a:ext>
-            </a:extLst>
-          </p:cNvPr>
-          <p:cNvSpPr txBox="1"/>
-          <p:nvPr/>
-        </p:nvSpPr>
-        <p:spPr>
-          <a:xfrm>
-            <a:off x="10532737" y="1494305"/>
-            <a:ext cx="231227" cy="371539"/>
-          </a:xfrm>
-          <a:prstGeom prst="rect">
-            <a:avLst/>
-          </a:prstGeom>
-          <a:noFill/>
-        </p:spPr>
-        <p:txBody>
-          <a:bodyPr wrap="square" rtlCol="0">
-            <a:spAutoFit/>
-          </a:bodyPr>
-          <a:lstStyle/>
-          <a:p>
-            <a:r>
-              <a:rPr lang="en-US" dirty="0"/>
-              <a:t>3</a:t>
-            </a:r>
-          </a:p>
-        </p:txBody>
-      </p:sp>
-      <p:sp>
-        <p:nvSpPr>
-          <p:cNvPr id="28" name="TextBox 27">
-            <a:extLst>
-              <a:ext uri="{FF2B5EF4-FFF2-40B4-BE49-F238E27FC236}">
-                <a16:creationId xmlns:a16="http://schemas.microsoft.com/office/drawing/2014/main" id="{7E7690C4-5413-45FF-9040-635FFA2AD24E}"/>
-              </a:ext>
-            </a:extLst>
-          </p:cNvPr>
-          <p:cNvSpPr txBox="1"/>
-          <p:nvPr/>
-        </p:nvSpPr>
-        <p:spPr>
-          <a:xfrm>
-            <a:off x="10809891" y="1480380"/>
-            <a:ext cx="231227" cy="371539"/>
-          </a:xfrm>
-          <a:prstGeom prst="rect">
-            <a:avLst/>
-          </a:prstGeom>
-          <a:noFill/>
-        </p:spPr>
-        <p:txBody>
-          <a:bodyPr wrap="square" rtlCol="0">
-            <a:spAutoFit/>
-          </a:bodyPr>
-          <a:lstStyle/>
-          <a:p>
-            <a:r>
-              <a:rPr lang="en-US" dirty="0"/>
-              <a:t>8</a:t>
-            </a:r>
-          </a:p>
-        </p:txBody>
-      </p:sp>
-      <p:sp>
-        <p:nvSpPr>
-          <p:cNvPr id="29" name="TextBox 28">
-            <a:extLst>
-              <a:ext uri="{FF2B5EF4-FFF2-40B4-BE49-F238E27FC236}">
-                <a16:creationId xmlns:a16="http://schemas.microsoft.com/office/drawing/2014/main" id="{95602401-8014-435F-BC5D-9BC6400F51EA}"/>
-              </a:ext>
-            </a:extLst>
-          </p:cNvPr>
-          <p:cNvSpPr txBox="1"/>
-          <p:nvPr/>
-        </p:nvSpPr>
-        <p:spPr>
-          <a:xfrm>
-            <a:off x="11125202" y="1466193"/>
-            <a:ext cx="231227" cy="371539"/>
-          </a:xfrm>
-          <a:prstGeom prst="rect">
-            <a:avLst/>
-          </a:prstGeom>
-          <a:noFill/>
-        </p:spPr>
-        <p:txBody>
-          <a:bodyPr wrap="square" rtlCol="0">
-            <a:spAutoFit/>
-          </a:bodyPr>
-          <a:lstStyle/>
-          <a:p>
-            <a:r>
-              <a:rPr lang="en-US" dirty="0"/>
-              <a:t>1</a:t>
-            </a:r>
-          </a:p>
-        </p:txBody>
-      </p:sp>
-      <p:sp>
-        <p:nvSpPr>
-          <p:cNvPr id="30" name="TextBox 29">
-            <a:extLst>
-              <a:ext uri="{FF2B5EF4-FFF2-40B4-BE49-F238E27FC236}">
-                <a16:creationId xmlns:a16="http://schemas.microsoft.com/office/drawing/2014/main" id="{0F394F95-EDDB-4768-A6B9-D8DE15D0125D}"/>
-              </a:ext>
-            </a:extLst>
-          </p:cNvPr>
-          <p:cNvSpPr txBox="1"/>
-          <p:nvPr/>
-        </p:nvSpPr>
-        <p:spPr>
-          <a:xfrm>
-            <a:off x="8118581" y="1466193"/>
-            <a:ext cx="231227" cy="371539"/>
-          </a:xfrm>
-          <a:prstGeom prst="rect">
-            <a:avLst/>
-          </a:prstGeom>
-          <a:noFill/>
-        </p:spPr>
-        <p:txBody>
-          <a:bodyPr wrap="square" rtlCol="0">
-            <a:spAutoFit/>
-          </a:bodyPr>
-          <a:lstStyle/>
-          <a:p>
-            <a:r>
-              <a:rPr lang="en-US" dirty="0"/>
-              <a:t>1</a:t>
-            </a:r>
-          </a:p>
-        </p:txBody>
-      </p:sp>
-      <p:sp>
-        <p:nvSpPr>
-          <p:cNvPr id="31" name="TextBox 30">
-            <a:extLst>
-              <a:ext uri="{FF2B5EF4-FFF2-40B4-BE49-F238E27FC236}">
-                <a16:creationId xmlns:a16="http://schemas.microsoft.com/office/drawing/2014/main" id="{8C91ACB8-8F46-4AC9-8BD6-D860D159166B}"/>
-              </a:ext>
-            </a:extLst>
-          </p:cNvPr>
-          <p:cNvSpPr txBox="1"/>
-          <p:nvPr/>
-        </p:nvSpPr>
-        <p:spPr>
-          <a:xfrm>
-            <a:off x="8419146" y="1460942"/>
-            <a:ext cx="231227" cy="371539"/>
-          </a:xfrm>
-          <a:prstGeom prst="rect">
-            <a:avLst/>
-          </a:prstGeom>
-          <a:noFill/>
-        </p:spPr>
-        <p:txBody>
-          <a:bodyPr wrap="square" rtlCol="0">
-            <a:spAutoFit/>
-          </a:bodyPr>
-          <a:lstStyle/>
-          <a:p>
-            <a:r>
-              <a:rPr lang="en-US" dirty="0"/>
-              <a:t>1</a:t>
-            </a:r>
-          </a:p>
-        </p:txBody>
-      </p:sp>
-      <p:sp>
-        <p:nvSpPr>
-          <p:cNvPr id="32" name="TextBox 31">
-            <a:extLst>
-              <a:ext uri="{FF2B5EF4-FFF2-40B4-BE49-F238E27FC236}">
-                <a16:creationId xmlns:a16="http://schemas.microsoft.com/office/drawing/2014/main" id="{C20E3C3C-F9A6-46BC-B4D2-8A5A604D091F}"/>
-              </a:ext>
-            </a:extLst>
-          </p:cNvPr>
-          <p:cNvSpPr txBox="1"/>
-          <p:nvPr/>
-        </p:nvSpPr>
-        <p:spPr>
-          <a:xfrm>
-            <a:off x="8705499" y="1433085"/>
-            <a:ext cx="231227" cy="371539"/>
-          </a:xfrm>
-          <a:prstGeom prst="rect">
-            <a:avLst/>
-          </a:prstGeom>
-          <a:noFill/>
-        </p:spPr>
-        <p:txBody>
-          <a:bodyPr wrap="square" rtlCol="0">
-            <a:spAutoFit/>
-          </a:bodyPr>
-          <a:lstStyle/>
-          <a:p>
-            <a:r>
-              <a:rPr lang="en-US" dirty="0"/>
-              <a:t>1</a:t>
-            </a:r>
-          </a:p>
-        </p:txBody>
-      </p:sp>
-      <p:sp>
-        <p:nvSpPr>
-          <p:cNvPr id="33" name="TextBox 32">
-            <a:extLst>
-              <a:ext uri="{FF2B5EF4-FFF2-40B4-BE49-F238E27FC236}">
-                <a16:creationId xmlns:a16="http://schemas.microsoft.com/office/drawing/2014/main" id="{1FDE3411-C288-46F7-A444-4566E4A8069D}"/>
-              </a:ext>
-            </a:extLst>
-          </p:cNvPr>
-          <p:cNvSpPr txBox="1"/>
-          <p:nvPr/>
-        </p:nvSpPr>
-        <p:spPr>
-          <a:xfrm>
-            <a:off x="8953851" y="1439918"/>
-            <a:ext cx="231227" cy="371539"/>
-          </a:xfrm>
-          <a:prstGeom prst="rect">
-            <a:avLst/>
-          </a:prstGeom>
-          <a:noFill/>
-        </p:spPr>
-        <p:txBody>
-          <a:bodyPr wrap="square" rtlCol="0">
-            <a:spAutoFit/>
-          </a:bodyPr>
-          <a:lstStyle/>
-          <a:p>
-            <a:r>
-              <a:rPr lang="en-US" dirty="0"/>
-              <a:t>1</a:t>
-            </a:r>
-          </a:p>
-        </p:txBody>
-      </p:sp>
-      <p:sp>
-        <p:nvSpPr>
-          <p:cNvPr id="34" name="TextBox 33">
-            <a:extLst>
-              <a:ext uri="{FF2B5EF4-FFF2-40B4-BE49-F238E27FC236}">
-                <a16:creationId xmlns:a16="http://schemas.microsoft.com/office/drawing/2014/main" id="{953260AB-6588-4B25-BA84-08CCE53116A6}"/>
-              </a:ext>
-            </a:extLst>
-          </p:cNvPr>
-          <p:cNvSpPr txBox="1"/>
-          <p:nvPr/>
-        </p:nvSpPr>
-        <p:spPr>
-          <a:xfrm>
-            <a:off x="9255446" y="1466193"/>
-            <a:ext cx="231227" cy="371539"/>
-          </a:xfrm>
-          <a:prstGeom prst="rect">
-            <a:avLst/>
-          </a:prstGeom>
-          <a:noFill/>
-        </p:spPr>
-        <p:txBody>
-          <a:bodyPr wrap="square" rtlCol="0">
-            <a:spAutoFit/>
-          </a:bodyPr>
-          <a:lstStyle/>
-          <a:p>
-            <a:r>
-              <a:rPr lang="en-US" dirty="0"/>
-              <a:t>1</a:t>
-            </a:r>
-          </a:p>
-        </p:txBody>
-      </p:sp>
-      <p:sp>
-        <p:nvSpPr>
-          <p:cNvPr id="35" name="TextBox 34">
-            <a:extLst>
-              <a:ext uri="{FF2B5EF4-FFF2-40B4-BE49-F238E27FC236}">
-                <a16:creationId xmlns:a16="http://schemas.microsoft.com/office/drawing/2014/main" id="{217B7C3C-D6FE-4715-A7C2-1948B1142F1A}"/>
-              </a:ext>
-            </a:extLst>
-          </p:cNvPr>
-          <p:cNvSpPr txBox="1"/>
-          <p:nvPr/>
-        </p:nvSpPr>
-        <p:spPr>
-          <a:xfrm>
-            <a:off x="9596924" y="1439919"/>
-            <a:ext cx="231227" cy="371539"/>
-          </a:xfrm>
-          <a:prstGeom prst="rect">
-            <a:avLst/>
-          </a:prstGeom>
-          <a:noFill/>
-        </p:spPr>
-        <p:txBody>
-          <a:bodyPr wrap="square" rtlCol="0">
-            <a:spAutoFit/>
-          </a:bodyPr>
-          <a:lstStyle/>
-          <a:p>
-            <a:r>
-              <a:rPr lang="en-US" dirty="0"/>
-              <a:t>1</a:t>
-            </a:r>
-          </a:p>
-        </p:txBody>
-      </p:sp>
-      <p:sp>
-        <p:nvSpPr>
-          <p:cNvPr id="36" name="TextBox 35">
-            <a:extLst>
-              <a:ext uri="{FF2B5EF4-FFF2-40B4-BE49-F238E27FC236}">
-                <a16:creationId xmlns:a16="http://schemas.microsoft.com/office/drawing/2014/main" id="{B6FCCBAA-9344-4116-BDFD-65F4CB4494AE}"/>
-              </a:ext>
-            </a:extLst>
-          </p:cNvPr>
-          <p:cNvSpPr txBox="1"/>
-          <p:nvPr/>
-        </p:nvSpPr>
-        <p:spPr>
-          <a:xfrm>
-            <a:off x="6594324" y="1456601"/>
-            <a:ext cx="231227" cy="371539"/>
-          </a:xfrm>
-          <a:prstGeom prst="rect">
-            <a:avLst/>
-          </a:prstGeom>
-          <a:noFill/>
-        </p:spPr>
-        <p:txBody>
-          <a:bodyPr wrap="square" rtlCol="0">
-            <a:spAutoFit/>
-          </a:bodyPr>
-          <a:lstStyle/>
-          <a:p>
-            <a:r>
-              <a:rPr lang="en-US" dirty="0"/>
-              <a:t>1</a:t>
-            </a:r>
-          </a:p>
-        </p:txBody>
-      </p:sp>
-      <p:sp>
-        <p:nvSpPr>
-          <p:cNvPr id="37" name="TextBox 36">
-            <a:extLst>
-              <a:ext uri="{FF2B5EF4-FFF2-40B4-BE49-F238E27FC236}">
-                <a16:creationId xmlns:a16="http://schemas.microsoft.com/office/drawing/2014/main" id="{87F39348-6FA6-416D-82DA-9FD3D4FA0A25}"/>
-              </a:ext>
-            </a:extLst>
-          </p:cNvPr>
-          <p:cNvSpPr txBox="1"/>
-          <p:nvPr/>
-        </p:nvSpPr>
-        <p:spPr>
-          <a:xfrm>
-            <a:off x="6926531" y="1450431"/>
-            <a:ext cx="231227" cy="371539"/>
-          </a:xfrm>
-          <a:prstGeom prst="rect">
-            <a:avLst/>
-          </a:prstGeom>
-          <a:noFill/>
-        </p:spPr>
-        <p:txBody>
-          <a:bodyPr wrap="square" rtlCol="0">
-            <a:spAutoFit/>
-          </a:bodyPr>
-          <a:lstStyle/>
-          <a:p>
-            <a:r>
-              <a:rPr lang="en-US" dirty="0"/>
-              <a:t>5</a:t>
-            </a:r>
-          </a:p>
-        </p:txBody>
-      </p:sp>
-      <p:sp>
-        <p:nvSpPr>
-          <p:cNvPr id="38" name="TextBox 37">
-            <a:extLst>
-              <a:ext uri="{FF2B5EF4-FFF2-40B4-BE49-F238E27FC236}">
-                <a16:creationId xmlns:a16="http://schemas.microsoft.com/office/drawing/2014/main" id="{37A42EFF-EB86-4130-A232-5C9795FF9785}"/>
-              </a:ext>
-            </a:extLst>
-          </p:cNvPr>
-          <p:cNvSpPr txBox="1"/>
-          <p:nvPr/>
-        </p:nvSpPr>
-        <p:spPr>
-          <a:xfrm>
-            <a:off x="7814073" y="1455686"/>
-            <a:ext cx="231227" cy="371539"/>
-          </a:xfrm>
-          <a:prstGeom prst="rect">
-            <a:avLst/>
-          </a:prstGeom>
-          <a:noFill/>
-        </p:spPr>
-        <p:txBody>
-          <a:bodyPr wrap="square" rtlCol="0">
-            <a:spAutoFit/>
-          </a:bodyPr>
-          <a:lstStyle/>
-          <a:p>
-            <a:r>
-              <a:rPr lang="en-US" dirty="0"/>
-              <a:t>1</a:t>
-            </a:r>
-          </a:p>
-        </p:txBody>
-      </p:sp>
-      <p:sp>
-        <p:nvSpPr>
-          <p:cNvPr id="39" name="TextBox 38">
-            <a:extLst>
-              <a:ext uri="{FF2B5EF4-FFF2-40B4-BE49-F238E27FC236}">
-                <a16:creationId xmlns:a16="http://schemas.microsoft.com/office/drawing/2014/main" id="{44A2A77B-3F3A-4BF4-9F7B-A4595EAB5F07}"/>
-              </a:ext>
-            </a:extLst>
-          </p:cNvPr>
-          <p:cNvSpPr txBox="1"/>
-          <p:nvPr/>
-        </p:nvSpPr>
-        <p:spPr>
-          <a:xfrm>
-            <a:off x="7250985" y="1466193"/>
-            <a:ext cx="231227" cy="371539"/>
-          </a:xfrm>
-          <a:prstGeom prst="rect">
-            <a:avLst/>
-          </a:prstGeom>
-          <a:noFill/>
-        </p:spPr>
-        <p:txBody>
-          <a:bodyPr wrap="square" rtlCol="0">
-            <a:spAutoFit/>
-          </a:bodyPr>
-          <a:lstStyle/>
-          <a:p>
-            <a:r>
-              <a:rPr lang="en-US" dirty="0"/>
-              <a:t>1</a:t>
-            </a:r>
-          </a:p>
-        </p:txBody>
-      </p:sp>
-      <p:sp>
-        <p:nvSpPr>
-          <p:cNvPr id="40" name="TextBox 39">
-            <a:extLst>
-              <a:ext uri="{FF2B5EF4-FFF2-40B4-BE49-F238E27FC236}">
-                <a16:creationId xmlns:a16="http://schemas.microsoft.com/office/drawing/2014/main" id="{F7E5E748-02ED-44CA-85DA-B0164E54541D}"/>
-              </a:ext>
-            </a:extLst>
-          </p:cNvPr>
-          <p:cNvSpPr txBox="1"/>
-          <p:nvPr/>
-        </p:nvSpPr>
-        <p:spPr>
-          <a:xfrm>
-            <a:off x="7519784" y="1466193"/>
-            <a:ext cx="231227" cy="371539"/>
-          </a:xfrm>
-          <a:prstGeom prst="rect">
-            <a:avLst/>
-          </a:prstGeom>
-          <a:noFill/>
-        </p:spPr>
-        <p:txBody>
-          <a:bodyPr wrap="square" rtlCol="0">
-            <a:spAutoFit/>
-          </a:bodyPr>
-          <a:lstStyle/>
-          <a:p>
-            <a:r>
-              <a:rPr lang="en-US" dirty="0"/>
-              <a:t>1</a:t>
-            </a:r>
-          </a:p>
-        </p:txBody>
-      </p:sp>
-      <p:sp>
-        <p:nvSpPr>
-          <p:cNvPr id="42" name="TextBox 41">
-            <a:extLst>
-              <a:ext uri="{FF2B5EF4-FFF2-40B4-BE49-F238E27FC236}">
-                <a16:creationId xmlns:a16="http://schemas.microsoft.com/office/drawing/2014/main" id="{77315151-42B9-4A3D-BC2C-3D0CD8CC32FE}"/>
-              </a:ext>
-            </a:extLst>
-          </p:cNvPr>
-          <p:cNvSpPr txBox="1"/>
-          <p:nvPr/>
-        </p:nvSpPr>
-        <p:spPr>
-          <a:xfrm>
-            <a:off x="6284111" y="1460941"/>
-            <a:ext cx="231227" cy="371539"/>
-          </a:xfrm>
-          <a:prstGeom prst="rect">
-            <a:avLst/>
-          </a:prstGeom>
-          <a:noFill/>
-        </p:spPr>
-        <p:txBody>
-          <a:bodyPr wrap="square" rtlCol="0">
-            <a:spAutoFit/>
-          </a:bodyPr>
-          <a:lstStyle/>
-          <a:p>
-            <a:r>
-              <a:rPr lang="en-US" dirty="0"/>
-              <a:t>1</a:t>
-            </a:r>
-          </a:p>
-        </p:txBody>
-      </p:sp>
+        </p:grpSpPr>
+        <p:pic>
+          <p:nvPicPr>
+            <p:cNvPr id="5" name="Picture 4" descr="Chart, histogram&#10;&#10;Description automatically generated">
+              <a:extLst>
+                <a:ext uri="{FF2B5EF4-FFF2-40B4-BE49-F238E27FC236}">
+                  <a16:creationId xmlns:a16="http://schemas.microsoft.com/office/drawing/2014/main" id="{A3615187-428F-4CAC-8277-B15326CFD0BB}"/>
+                </a:ext>
+              </a:extLst>
+            </p:cNvPr>
+            <p:cNvPicPr>
+              <a:picLocks noChangeAspect="1"/>
+            </p:cNvPicPr>
+            <p:nvPr/>
+          </p:nvPicPr>
+          <p:blipFill rotWithShape="1">
+            <a:blip r:embed="rId2">
+              <a:extLst>
+                <a:ext uri="{28A0092B-C50C-407E-A947-70E740481C1C}">
+                  <a14:useLocalDpi xmlns:a14="http://schemas.microsoft.com/office/drawing/2010/main" val="0"/>
+                </a:ext>
+              </a:extLst>
+            </a:blip>
+            <a:srcRect t="12873"/>
+            <a:stretch/>
+          </p:blipFill>
+          <p:spPr>
+            <a:xfrm>
+              <a:off x="607262" y="1790436"/>
+              <a:ext cx="11290341" cy="3277127"/>
+            </a:xfrm>
+            <a:prstGeom prst="rect">
+              <a:avLst/>
+            </a:prstGeom>
+          </p:spPr>
+        </p:pic>
+        <p:sp>
+          <p:nvSpPr>
+            <p:cNvPr id="6" name="TextBox 5">
+              <a:extLst>
+                <a:ext uri="{FF2B5EF4-FFF2-40B4-BE49-F238E27FC236}">
+                  <a16:creationId xmlns:a16="http://schemas.microsoft.com/office/drawing/2014/main" id="{AE640E3A-58EC-4119-B092-4DFC8E2073FB}"/>
+                </a:ext>
+              </a:extLst>
+            </p:cNvPr>
+            <p:cNvSpPr txBox="1"/>
+            <p:nvPr/>
+          </p:nvSpPr>
+          <p:spPr>
+            <a:xfrm>
+              <a:off x="872935" y="1497981"/>
+              <a:ext cx="231227" cy="307777"/>
+            </a:xfrm>
+            <a:prstGeom prst="rect">
+              <a:avLst/>
+            </a:prstGeom>
+            <a:noFill/>
+          </p:spPr>
+          <p:txBody>
+            <a:bodyPr wrap="square" rtlCol="0">
+              <a:spAutoFit/>
+            </a:bodyPr>
+            <a:lstStyle/>
+            <a:p>
+              <a:r>
+                <a:rPr lang="en-US" sz="1400" dirty="0">
+                  <a:latin typeface="Helvetica" panose="020B0604020202020204" pitchFamily="34" charset="0"/>
+                  <a:cs typeface="Helvetica" panose="020B0604020202020204" pitchFamily="34" charset="0"/>
+                </a:rPr>
+                <a:t>8</a:t>
+              </a:r>
+            </a:p>
+          </p:txBody>
+        </p:sp>
+        <p:sp>
+          <p:nvSpPr>
+            <p:cNvPr id="7" name="TextBox 6">
+              <a:extLst>
+                <a:ext uri="{FF2B5EF4-FFF2-40B4-BE49-F238E27FC236}">
+                  <a16:creationId xmlns:a16="http://schemas.microsoft.com/office/drawing/2014/main" id="{E089C40A-676F-44B6-9800-D307CFA19B22}"/>
+                </a:ext>
+              </a:extLst>
+            </p:cNvPr>
+            <p:cNvSpPr txBox="1"/>
+            <p:nvPr/>
+          </p:nvSpPr>
+          <p:spPr>
+            <a:xfrm>
+              <a:off x="1135083" y="1497981"/>
+              <a:ext cx="520071" cy="307777"/>
+            </a:xfrm>
+            <a:prstGeom prst="rect">
+              <a:avLst/>
+            </a:prstGeom>
+            <a:noFill/>
+          </p:spPr>
+          <p:txBody>
+            <a:bodyPr wrap="square" rtlCol="0">
+              <a:spAutoFit/>
+            </a:bodyPr>
+            <a:lstStyle/>
+            <a:p>
+              <a:r>
+                <a:rPr lang="en-US" sz="1400" dirty="0">
+                  <a:latin typeface="Helvetica" panose="020B0604020202020204" pitchFamily="34" charset="0"/>
+                  <a:cs typeface="Helvetica" panose="020B0604020202020204" pitchFamily="34" charset="0"/>
+                </a:rPr>
+                <a:t>20</a:t>
+              </a:r>
+            </a:p>
+          </p:txBody>
+        </p:sp>
+        <p:sp>
+          <p:nvSpPr>
+            <p:cNvPr id="8" name="TextBox 7">
+              <a:extLst>
+                <a:ext uri="{FF2B5EF4-FFF2-40B4-BE49-F238E27FC236}">
+                  <a16:creationId xmlns:a16="http://schemas.microsoft.com/office/drawing/2014/main" id="{F242D657-9634-45E2-8D70-7B5E0179791E}"/>
+                </a:ext>
+              </a:extLst>
+            </p:cNvPr>
+            <p:cNvSpPr txBox="1"/>
+            <p:nvPr/>
+          </p:nvSpPr>
+          <p:spPr>
+            <a:xfrm>
+              <a:off x="1486682" y="1497981"/>
+              <a:ext cx="231227" cy="307777"/>
+            </a:xfrm>
+            <a:prstGeom prst="rect">
+              <a:avLst/>
+            </a:prstGeom>
+            <a:noFill/>
+          </p:spPr>
+          <p:txBody>
+            <a:bodyPr wrap="square" rtlCol="0">
+              <a:spAutoFit/>
+            </a:bodyPr>
+            <a:lstStyle/>
+            <a:p>
+              <a:r>
+                <a:rPr lang="en-US" sz="1400" dirty="0">
+                  <a:latin typeface="Helvetica" panose="020B0604020202020204" pitchFamily="34" charset="0"/>
+                  <a:cs typeface="Helvetica" panose="020B0604020202020204" pitchFamily="34" charset="0"/>
+                </a:rPr>
+                <a:t>6</a:t>
+              </a:r>
+            </a:p>
+          </p:txBody>
+        </p:sp>
+        <p:sp>
+          <p:nvSpPr>
+            <p:cNvPr id="9" name="TextBox 8">
+              <a:extLst>
+                <a:ext uri="{FF2B5EF4-FFF2-40B4-BE49-F238E27FC236}">
+                  <a16:creationId xmlns:a16="http://schemas.microsoft.com/office/drawing/2014/main" id="{453AAB2B-57AD-4EE9-87C1-6371111E8A13}"/>
+                </a:ext>
+              </a:extLst>
+            </p:cNvPr>
+            <p:cNvSpPr txBox="1"/>
+            <p:nvPr/>
+          </p:nvSpPr>
+          <p:spPr>
+            <a:xfrm>
+              <a:off x="2148429" y="1497981"/>
+              <a:ext cx="231227" cy="307777"/>
+            </a:xfrm>
+            <a:prstGeom prst="rect">
+              <a:avLst/>
+            </a:prstGeom>
+            <a:noFill/>
+          </p:spPr>
+          <p:txBody>
+            <a:bodyPr wrap="square" rtlCol="0">
+              <a:spAutoFit/>
+            </a:bodyPr>
+            <a:lstStyle/>
+            <a:p>
+              <a:r>
+                <a:rPr lang="en-US" sz="1400" dirty="0">
+                  <a:latin typeface="Helvetica" panose="020B0604020202020204" pitchFamily="34" charset="0"/>
+                  <a:cs typeface="Helvetica" panose="020B0604020202020204" pitchFamily="34" charset="0"/>
+                </a:rPr>
+                <a:t>1</a:t>
+              </a:r>
+            </a:p>
+          </p:txBody>
+        </p:sp>
+        <p:sp>
+          <p:nvSpPr>
+            <p:cNvPr id="10" name="TextBox 9">
+              <a:extLst>
+                <a:ext uri="{FF2B5EF4-FFF2-40B4-BE49-F238E27FC236}">
+                  <a16:creationId xmlns:a16="http://schemas.microsoft.com/office/drawing/2014/main" id="{1508B414-ACE3-4905-B545-C20ED5FBA9FB}"/>
+                </a:ext>
+              </a:extLst>
+            </p:cNvPr>
+            <p:cNvSpPr txBox="1"/>
+            <p:nvPr/>
+          </p:nvSpPr>
+          <p:spPr>
+            <a:xfrm>
+              <a:off x="1874649" y="1497981"/>
+              <a:ext cx="231227" cy="307777"/>
+            </a:xfrm>
+            <a:prstGeom prst="rect">
+              <a:avLst/>
+            </a:prstGeom>
+            <a:noFill/>
+          </p:spPr>
+          <p:txBody>
+            <a:bodyPr wrap="square" rtlCol="0">
+              <a:spAutoFit/>
+            </a:bodyPr>
+            <a:lstStyle/>
+            <a:p>
+              <a:r>
+                <a:rPr lang="en-US" sz="1400" dirty="0">
+                  <a:latin typeface="Helvetica" panose="020B0604020202020204" pitchFamily="34" charset="0"/>
+                  <a:cs typeface="Helvetica" panose="020B0604020202020204" pitchFamily="34" charset="0"/>
+                </a:rPr>
+                <a:t>1</a:t>
+              </a:r>
+            </a:p>
+          </p:txBody>
+        </p:sp>
+        <p:sp>
+          <p:nvSpPr>
+            <p:cNvPr id="11" name="TextBox 10">
+              <a:extLst>
+                <a:ext uri="{FF2B5EF4-FFF2-40B4-BE49-F238E27FC236}">
+                  <a16:creationId xmlns:a16="http://schemas.microsoft.com/office/drawing/2014/main" id="{70C0EF47-76FB-4C32-8869-B2CCE5D60D3A}"/>
+                </a:ext>
+              </a:extLst>
+            </p:cNvPr>
+            <p:cNvSpPr txBox="1"/>
+            <p:nvPr/>
+          </p:nvSpPr>
+          <p:spPr>
+            <a:xfrm>
+              <a:off x="2755685" y="1497981"/>
+              <a:ext cx="231227" cy="307777"/>
+            </a:xfrm>
+            <a:prstGeom prst="rect">
+              <a:avLst/>
+            </a:prstGeom>
+            <a:noFill/>
+          </p:spPr>
+          <p:txBody>
+            <a:bodyPr wrap="square" rtlCol="0">
+              <a:spAutoFit/>
+            </a:bodyPr>
+            <a:lstStyle/>
+            <a:p>
+              <a:r>
+                <a:rPr lang="en-US" sz="1400" dirty="0">
+                  <a:latin typeface="Helvetica" panose="020B0604020202020204" pitchFamily="34" charset="0"/>
+                  <a:cs typeface="Helvetica" panose="020B0604020202020204" pitchFamily="34" charset="0"/>
+                </a:rPr>
+                <a:t>1</a:t>
+              </a:r>
+            </a:p>
+          </p:txBody>
+        </p:sp>
+        <p:sp>
+          <p:nvSpPr>
+            <p:cNvPr id="12" name="TextBox 11">
+              <a:extLst>
+                <a:ext uri="{FF2B5EF4-FFF2-40B4-BE49-F238E27FC236}">
+                  <a16:creationId xmlns:a16="http://schemas.microsoft.com/office/drawing/2014/main" id="{8B27411F-765F-42CB-8AD0-82B364E732EC}"/>
+                </a:ext>
+              </a:extLst>
+            </p:cNvPr>
+            <p:cNvSpPr txBox="1"/>
+            <p:nvPr/>
+          </p:nvSpPr>
+          <p:spPr>
+            <a:xfrm>
+              <a:off x="2462004" y="1497981"/>
+              <a:ext cx="231227" cy="307777"/>
+            </a:xfrm>
+            <a:prstGeom prst="rect">
+              <a:avLst/>
+            </a:prstGeom>
+            <a:noFill/>
+          </p:spPr>
+          <p:txBody>
+            <a:bodyPr wrap="square" rtlCol="0">
+              <a:spAutoFit/>
+            </a:bodyPr>
+            <a:lstStyle/>
+            <a:p>
+              <a:r>
+                <a:rPr lang="en-US" sz="1400" dirty="0">
+                  <a:latin typeface="Helvetica" panose="020B0604020202020204" pitchFamily="34" charset="0"/>
+                  <a:cs typeface="Helvetica" panose="020B0604020202020204" pitchFamily="34" charset="0"/>
+                </a:rPr>
+                <a:t>3</a:t>
+              </a:r>
+            </a:p>
+          </p:txBody>
+        </p:sp>
+        <p:sp>
+          <p:nvSpPr>
+            <p:cNvPr id="13" name="TextBox 12">
+              <a:extLst>
+                <a:ext uri="{FF2B5EF4-FFF2-40B4-BE49-F238E27FC236}">
+                  <a16:creationId xmlns:a16="http://schemas.microsoft.com/office/drawing/2014/main" id="{A4DB1905-B680-4685-8EEA-5B7DB320121C}"/>
+                </a:ext>
+              </a:extLst>
+            </p:cNvPr>
+            <p:cNvSpPr txBox="1"/>
+            <p:nvPr/>
+          </p:nvSpPr>
+          <p:spPr>
+            <a:xfrm>
+              <a:off x="3038855" y="1497981"/>
+              <a:ext cx="231227" cy="307777"/>
+            </a:xfrm>
+            <a:prstGeom prst="rect">
+              <a:avLst/>
+            </a:prstGeom>
+            <a:noFill/>
+          </p:spPr>
+          <p:txBody>
+            <a:bodyPr wrap="square" rtlCol="0">
+              <a:spAutoFit/>
+            </a:bodyPr>
+            <a:lstStyle/>
+            <a:p>
+              <a:r>
+                <a:rPr lang="en-US" sz="1400" dirty="0">
+                  <a:latin typeface="Helvetica" panose="020B0604020202020204" pitchFamily="34" charset="0"/>
+                  <a:cs typeface="Helvetica" panose="020B0604020202020204" pitchFamily="34" charset="0"/>
+                </a:rPr>
+                <a:t>1</a:t>
+              </a:r>
+            </a:p>
+          </p:txBody>
+        </p:sp>
+        <p:sp>
+          <p:nvSpPr>
+            <p:cNvPr id="14" name="TextBox 13">
+              <a:extLst>
+                <a:ext uri="{FF2B5EF4-FFF2-40B4-BE49-F238E27FC236}">
+                  <a16:creationId xmlns:a16="http://schemas.microsoft.com/office/drawing/2014/main" id="{652B862E-4C84-49EC-AF59-B47892B65F53}"/>
+                </a:ext>
+              </a:extLst>
+            </p:cNvPr>
+            <p:cNvSpPr txBox="1"/>
+            <p:nvPr/>
+          </p:nvSpPr>
+          <p:spPr>
+            <a:xfrm>
+              <a:off x="3311508" y="1497981"/>
+              <a:ext cx="231227" cy="307777"/>
+            </a:xfrm>
+            <a:prstGeom prst="rect">
+              <a:avLst/>
+            </a:prstGeom>
+            <a:noFill/>
+          </p:spPr>
+          <p:txBody>
+            <a:bodyPr wrap="square" rtlCol="0">
+              <a:spAutoFit/>
+            </a:bodyPr>
+            <a:lstStyle/>
+            <a:p>
+              <a:r>
+                <a:rPr lang="en-US" sz="1400" dirty="0">
+                  <a:latin typeface="Helvetica" panose="020B0604020202020204" pitchFamily="34" charset="0"/>
+                  <a:cs typeface="Helvetica" panose="020B0604020202020204" pitchFamily="34" charset="0"/>
+                </a:rPr>
+                <a:t>1</a:t>
+              </a:r>
+            </a:p>
+          </p:txBody>
+        </p:sp>
+        <p:sp>
+          <p:nvSpPr>
+            <p:cNvPr id="15" name="TextBox 14">
+              <a:extLst>
+                <a:ext uri="{FF2B5EF4-FFF2-40B4-BE49-F238E27FC236}">
+                  <a16:creationId xmlns:a16="http://schemas.microsoft.com/office/drawing/2014/main" id="{CC2BA1B4-62D6-4922-9D4E-BE3FEE691E54}"/>
+                </a:ext>
+              </a:extLst>
+            </p:cNvPr>
+            <p:cNvSpPr txBox="1"/>
+            <p:nvPr/>
+          </p:nvSpPr>
+          <p:spPr>
+            <a:xfrm>
+              <a:off x="3605186" y="1497981"/>
+              <a:ext cx="231227" cy="307777"/>
+            </a:xfrm>
+            <a:prstGeom prst="rect">
+              <a:avLst/>
+            </a:prstGeom>
+            <a:noFill/>
+          </p:spPr>
+          <p:txBody>
+            <a:bodyPr wrap="square" rtlCol="0">
+              <a:spAutoFit/>
+            </a:bodyPr>
+            <a:lstStyle/>
+            <a:p>
+              <a:r>
+                <a:rPr lang="en-US" sz="1400" dirty="0">
+                  <a:latin typeface="Helvetica" panose="020B0604020202020204" pitchFamily="34" charset="0"/>
+                  <a:cs typeface="Helvetica" panose="020B0604020202020204" pitchFamily="34" charset="0"/>
+                </a:rPr>
+                <a:t>1</a:t>
+              </a:r>
+            </a:p>
+          </p:txBody>
+        </p:sp>
+        <p:sp>
+          <p:nvSpPr>
+            <p:cNvPr id="16" name="TextBox 15">
+              <a:extLst>
+                <a:ext uri="{FF2B5EF4-FFF2-40B4-BE49-F238E27FC236}">
+                  <a16:creationId xmlns:a16="http://schemas.microsoft.com/office/drawing/2014/main" id="{FDA8688B-23B2-4809-9956-EAE5D06FA7FB}"/>
+                </a:ext>
+              </a:extLst>
+            </p:cNvPr>
+            <p:cNvSpPr txBox="1"/>
+            <p:nvPr/>
+          </p:nvSpPr>
+          <p:spPr>
+            <a:xfrm>
+              <a:off x="4182031" y="1497981"/>
+              <a:ext cx="231227" cy="307777"/>
+            </a:xfrm>
+            <a:prstGeom prst="rect">
+              <a:avLst/>
+            </a:prstGeom>
+            <a:noFill/>
+          </p:spPr>
+          <p:txBody>
+            <a:bodyPr wrap="square" rtlCol="0">
+              <a:spAutoFit/>
+            </a:bodyPr>
+            <a:lstStyle/>
+            <a:p>
+              <a:r>
+                <a:rPr lang="en-US" sz="1400" dirty="0">
+                  <a:latin typeface="Helvetica" panose="020B0604020202020204" pitchFamily="34" charset="0"/>
+                  <a:cs typeface="Helvetica" panose="020B0604020202020204" pitchFamily="34" charset="0"/>
+                </a:rPr>
+                <a:t>5</a:t>
+              </a:r>
+            </a:p>
+          </p:txBody>
+        </p:sp>
+        <p:sp>
+          <p:nvSpPr>
+            <p:cNvPr id="17" name="TextBox 16">
+              <a:extLst>
+                <a:ext uri="{FF2B5EF4-FFF2-40B4-BE49-F238E27FC236}">
+                  <a16:creationId xmlns:a16="http://schemas.microsoft.com/office/drawing/2014/main" id="{844766E1-FAA2-43C5-A630-6A563C4C5A4E}"/>
+                </a:ext>
+              </a:extLst>
+            </p:cNvPr>
+            <p:cNvSpPr txBox="1"/>
+            <p:nvPr/>
+          </p:nvSpPr>
+          <p:spPr>
+            <a:xfrm>
+              <a:off x="3888353" y="1497981"/>
+              <a:ext cx="231227" cy="307777"/>
+            </a:xfrm>
+            <a:prstGeom prst="rect">
+              <a:avLst/>
+            </a:prstGeom>
+            <a:noFill/>
+          </p:spPr>
+          <p:txBody>
+            <a:bodyPr wrap="square" rtlCol="0">
+              <a:spAutoFit/>
+            </a:bodyPr>
+            <a:lstStyle/>
+            <a:p>
+              <a:r>
+                <a:rPr lang="en-US" sz="1400" dirty="0">
+                  <a:latin typeface="Helvetica" panose="020B0604020202020204" pitchFamily="34" charset="0"/>
+                  <a:cs typeface="Helvetica" panose="020B0604020202020204" pitchFamily="34" charset="0"/>
+                </a:rPr>
+                <a:t>1</a:t>
+              </a:r>
+            </a:p>
+          </p:txBody>
+        </p:sp>
+        <p:sp>
+          <p:nvSpPr>
+            <p:cNvPr id="18" name="TextBox 17">
+              <a:extLst>
+                <a:ext uri="{FF2B5EF4-FFF2-40B4-BE49-F238E27FC236}">
+                  <a16:creationId xmlns:a16="http://schemas.microsoft.com/office/drawing/2014/main" id="{7E4037F1-3BDC-4AED-A768-1F9F454A6BE4}"/>
+                </a:ext>
+              </a:extLst>
+            </p:cNvPr>
+            <p:cNvSpPr txBox="1"/>
+            <p:nvPr/>
+          </p:nvSpPr>
+          <p:spPr>
+            <a:xfrm>
+              <a:off x="4475710" y="1497981"/>
+              <a:ext cx="231227" cy="307777"/>
+            </a:xfrm>
+            <a:prstGeom prst="rect">
+              <a:avLst/>
+            </a:prstGeom>
+            <a:noFill/>
+          </p:spPr>
+          <p:txBody>
+            <a:bodyPr wrap="square" rtlCol="0">
+              <a:spAutoFit/>
+            </a:bodyPr>
+            <a:lstStyle/>
+            <a:p>
+              <a:r>
+                <a:rPr lang="en-US" sz="1400" dirty="0">
+                  <a:latin typeface="Helvetica" panose="020B0604020202020204" pitchFamily="34" charset="0"/>
+                  <a:cs typeface="Helvetica" panose="020B0604020202020204" pitchFamily="34" charset="0"/>
+                </a:rPr>
+                <a:t>1</a:t>
+              </a:r>
+            </a:p>
+          </p:txBody>
+        </p:sp>
+        <p:sp>
+          <p:nvSpPr>
+            <p:cNvPr id="19" name="TextBox 18">
+              <a:extLst>
+                <a:ext uri="{FF2B5EF4-FFF2-40B4-BE49-F238E27FC236}">
+                  <a16:creationId xmlns:a16="http://schemas.microsoft.com/office/drawing/2014/main" id="{08A7D3C4-9E13-4C21-B68C-0F9437AF0D4B}"/>
+                </a:ext>
+              </a:extLst>
+            </p:cNvPr>
+            <p:cNvSpPr txBox="1"/>
+            <p:nvPr/>
+          </p:nvSpPr>
+          <p:spPr>
+            <a:xfrm>
+              <a:off x="4874493" y="1497981"/>
+              <a:ext cx="231227" cy="307777"/>
+            </a:xfrm>
+            <a:prstGeom prst="rect">
+              <a:avLst/>
+            </a:prstGeom>
+            <a:noFill/>
+          </p:spPr>
+          <p:txBody>
+            <a:bodyPr wrap="square" rtlCol="0">
+              <a:spAutoFit/>
+            </a:bodyPr>
+            <a:lstStyle/>
+            <a:p>
+              <a:r>
+                <a:rPr lang="en-US" sz="1400" dirty="0">
+                  <a:latin typeface="Helvetica" panose="020B0604020202020204" pitchFamily="34" charset="0"/>
+                  <a:cs typeface="Helvetica" panose="020B0604020202020204" pitchFamily="34" charset="0"/>
+                </a:rPr>
+                <a:t>1</a:t>
+              </a:r>
+            </a:p>
+          </p:txBody>
+        </p:sp>
+        <p:sp>
+          <p:nvSpPr>
+            <p:cNvPr id="20" name="TextBox 19">
+              <a:extLst>
+                <a:ext uri="{FF2B5EF4-FFF2-40B4-BE49-F238E27FC236}">
+                  <a16:creationId xmlns:a16="http://schemas.microsoft.com/office/drawing/2014/main" id="{9A9EAE77-59B0-4F1F-B4FD-956439962202}"/>
+                </a:ext>
+              </a:extLst>
+            </p:cNvPr>
+            <p:cNvSpPr txBox="1"/>
+            <p:nvPr/>
+          </p:nvSpPr>
+          <p:spPr>
+            <a:xfrm>
+              <a:off x="5168171" y="1497981"/>
+              <a:ext cx="231227" cy="307777"/>
+            </a:xfrm>
+            <a:prstGeom prst="rect">
+              <a:avLst/>
+            </a:prstGeom>
+            <a:noFill/>
+          </p:spPr>
+          <p:txBody>
+            <a:bodyPr wrap="square" rtlCol="0">
+              <a:spAutoFit/>
+            </a:bodyPr>
+            <a:lstStyle/>
+            <a:p>
+              <a:r>
+                <a:rPr lang="en-US" sz="1400" dirty="0">
+                  <a:latin typeface="Helvetica" panose="020B0604020202020204" pitchFamily="34" charset="0"/>
+                  <a:cs typeface="Helvetica" panose="020B0604020202020204" pitchFamily="34" charset="0"/>
+                </a:rPr>
+                <a:t>1</a:t>
+              </a:r>
+            </a:p>
+          </p:txBody>
+        </p:sp>
+        <p:sp>
+          <p:nvSpPr>
+            <p:cNvPr id="21" name="TextBox 20">
+              <a:extLst>
+                <a:ext uri="{FF2B5EF4-FFF2-40B4-BE49-F238E27FC236}">
+                  <a16:creationId xmlns:a16="http://schemas.microsoft.com/office/drawing/2014/main" id="{F93FCA14-80C8-4087-93D1-38322C3B01F8}"/>
+                </a:ext>
+              </a:extLst>
+            </p:cNvPr>
+            <p:cNvSpPr txBox="1"/>
+            <p:nvPr/>
+          </p:nvSpPr>
+          <p:spPr>
+            <a:xfrm>
+              <a:off x="5451339" y="1497981"/>
+              <a:ext cx="231227" cy="307777"/>
+            </a:xfrm>
+            <a:prstGeom prst="rect">
+              <a:avLst/>
+            </a:prstGeom>
+            <a:noFill/>
+          </p:spPr>
+          <p:txBody>
+            <a:bodyPr wrap="square" rtlCol="0">
+              <a:spAutoFit/>
+            </a:bodyPr>
+            <a:lstStyle/>
+            <a:p>
+              <a:r>
+                <a:rPr lang="en-US" sz="1400" dirty="0">
+                  <a:latin typeface="Helvetica" panose="020B0604020202020204" pitchFamily="34" charset="0"/>
+                  <a:cs typeface="Helvetica" panose="020B0604020202020204" pitchFamily="34" charset="0"/>
+                </a:rPr>
+                <a:t>2</a:t>
+              </a:r>
+            </a:p>
+          </p:txBody>
+        </p:sp>
+        <p:sp>
+          <p:nvSpPr>
+            <p:cNvPr id="22" name="TextBox 21">
+              <a:extLst>
+                <a:ext uri="{FF2B5EF4-FFF2-40B4-BE49-F238E27FC236}">
+                  <a16:creationId xmlns:a16="http://schemas.microsoft.com/office/drawing/2014/main" id="{8C7F9BB6-D7BE-4F25-B597-104EA57B653E}"/>
+                </a:ext>
+              </a:extLst>
+            </p:cNvPr>
+            <p:cNvSpPr txBox="1"/>
+            <p:nvPr/>
+          </p:nvSpPr>
+          <p:spPr>
+            <a:xfrm>
+              <a:off x="5734507" y="1497981"/>
+              <a:ext cx="231227" cy="307777"/>
+            </a:xfrm>
+            <a:prstGeom prst="rect">
+              <a:avLst/>
+            </a:prstGeom>
+            <a:noFill/>
+          </p:spPr>
+          <p:txBody>
+            <a:bodyPr wrap="square" rtlCol="0">
+              <a:spAutoFit/>
+            </a:bodyPr>
+            <a:lstStyle/>
+            <a:p>
+              <a:r>
+                <a:rPr lang="en-US" sz="1400" dirty="0">
+                  <a:latin typeface="Helvetica" panose="020B0604020202020204" pitchFamily="34" charset="0"/>
+                  <a:cs typeface="Helvetica" panose="020B0604020202020204" pitchFamily="34" charset="0"/>
+                </a:rPr>
+                <a:t>1</a:t>
+              </a:r>
+            </a:p>
+          </p:txBody>
+        </p:sp>
+        <p:sp>
+          <p:nvSpPr>
+            <p:cNvPr id="23" name="TextBox 22">
+              <a:extLst>
+                <a:ext uri="{FF2B5EF4-FFF2-40B4-BE49-F238E27FC236}">
+                  <a16:creationId xmlns:a16="http://schemas.microsoft.com/office/drawing/2014/main" id="{CA0BE5FA-7733-4748-B8CF-215109C3C8A6}"/>
+                </a:ext>
+              </a:extLst>
+            </p:cNvPr>
+            <p:cNvSpPr txBox="1"/>
+            <p:nvPr/>
+          </p:nvSpPr>
+          <p:spPr>
+            <a:xfrm>
+              <a:off x="6017672" y="1497981"/>
+              <a:ext cx="231227" cy="307777"/>
+            </a:xfrm>
+            <a:prstGeom prst="rect">
+              <a:avLst/>
+            </a:prstGeom>
+            <a:noFill/>
+          </p:spPr>
+          <p:txBody>
+            <a:bodyPr wrap="square" rtlCol="0">
+              <a:spAutoFit/>
+            </a:bodyPr>
+            <a:lstStyle/>
+            <a:p>
+              <a:r>
+                <a:rPr lang="en-US" sz="1400" dirty="0">
+                  <a:latin typeface="Helvetica" panose="020B0604020202020204" pitchFamily="34" charset="0"/>
+                  <a:cs typeface="Helvetica" panose="020B0604020202020204" pitchFamily="34" charset="0"/>
+                </a:rPr>
+                <a:t>1</a:t>
+              </a:r>
+            </a:p>
+          </p:txBody>
+        </p:sp>
+        <p:sp>
+          <p:nvSpPr>
+            <p:cNvPr id="24" name="TextBox 23">
+              <a:extLst>
+                <a:ext uri="{FF2B5EF4-FFF2-40B4-BE49-F238E27FC236}">
+                  <a16:creationId xmlns:a16="http://schemas.microsoft.com/office/drawing/2014/main" id="{912D7C63-7B8B-48F7-B2BF-45BD1C6E265F}"/>
+                </a:ext>
+              </a:extLst>
+            </p:cNvPr>
+            <p:cNvSpPr txBox="1"/>
+            <p:nvPr/>
+          </p:nvSpPr>
+          <p:spPr>
+            <a:xfrm>
+              <a:off x="11440512" y="1497981"/>
+              <a:ext cx="231227" cy="307777"/>
+            </a:xfrm>
+            <a:prstGeom prst="rect">
+              <a:avLst/>
+            </a:prstGeom>
+            <a:noFill/>
+          </p:spPr>
+          <p:txBody>
+            <a:bodyPr wrap="square" rtlCol="0">
+              <a:spAutoFit/>
+            </a:bodyPr>
+            <a:lstStyle/>
+            <a:p>
+              <a:r>
+                <a:rPr lang="en-US" sz="1400" dirty="0">
+                  <a:latin typeface="Helvetica" panose="020B0604020202020204" pitchFamily="34" charset="0"/>
+                  <a:cs typeface="Helvetica" panose="020B0604020202020204" pitchFamily="34" charset="0"/>
+                </a:rPr>
+                <a:t>1</a:t>
+              </a:r>
+            </a:p>
+          </p:txBody>
+        </p:sp>
+        <p:sp>
+          <p:nvSpPr>
+            <p:cNvPr id="25" name="TextBox 24">
+              <a:extLst>
+                <a:ext uri="{FF2B5EF4-FFF2-40B4-BE49-F238E27FC236}">
+                  <a16:creationId xmlns:a16="http://schemas.microsoft.com/office/drawing/2014/main" id="{E4480204-175F-4047-8AB0-A57610CED8A3}"/>
+                </a:ext>
+              </a:extLst>
+            </p:cNvPr>
+            <p:cNvSpPr txBox="1"/>
+            <p:nvPr/>
+          </p:nvSpPr>
+          <p:spPr>
+            <a:xfrm>
+              <a:off x="9972119" y="1497981"/>
+              <a:ext cx="231227" cy="307777"/>
+            </a:xfrm>
+            <a:prstGeom prst="rect">
+              <a:avLst/>
+            </a:prstGeom>
+            <a:noFill/>
+          </p:spPr>
+          <p:txBody>
+            <a:bodyPr wrap="square" rtlCol="0">
+              <a:spAutoFit/>
+            </a:bodyPr>
+            <a:lstStyle/>
+            <a:p>
+              <a:r>
+                <a:rPr lang="en-US" sz="1400" dirty="0">
+                  <a:latin typeface="Helvetica" panose="020B0604020202020204" pitchFamily="34" charset="0"/>
+                  <a:cs typeface="Helvetica" panose="020B0604020202020204" pitchFamily="34" charset="0"/>
+                </a:rPr>
+                <a:t>1</a:t>
+              </a:r>
+            </a:p>
+          </p:txBody>
+        </p:sp>
+        <p:sp>
+          <p:nvSpPr>
+            <p:cNvPr id="26" name="TextBox 25">
+              <a:extLst>
+                <a:ext uri="{FF2B5EF4-FFF2-40B4-BE49-F238E27FC236}">
+                  <a16:creationId xmlns:a16="http://schemas.microsoft.com/office/drawing/2014/main" id="{08514154-F255-427F-8A7B-0327047B78AD}"/>
+                </a:ext>
+              </a:extLst>
+            </p:cNvPr>
+            <p:cNvSpPr txBox="1"/>
+            <p:nvPr/>
+          </p:nvSpPr>
+          <p:spPr>
+            <a:xfrm>
+              <a:off x="10265797" y="1497981"/>
+              <a:ext cx="231227" cy="307777"/>
+            </a:xfrm>
+            <a:prstGeom prst="rect">
+              <a:avLst/>
+            </a:prstGeom>
+            <a:noFill/>
+          </p:spPr>
+          <p:txBody>
+            <a:bodyPr wrap="square" rtlCol="0">
+              <a:spAutoFit/>
+            </a:bodyPr>
+            <a:lstStyle/>
+            <a:p>
+              <a:r>
+                <a:rPr lang="en-US" sz="1400" dirty="0">
+                  <a:latin typeface="Helvetica" panose="020B0604020202020204" pitchFamily="34" charset="0"/>
+                  <a:cs typeface="Helvetica" panose="020B0604020202020204" pitchFamily="34" charset="0"/>
+                </a:rPr>
+                <a:t>1</a:t>
+              </a:r>
+            </a:p>
+          </p:txBody>
+        </p:sp>
+        <p:sp>
+          <p:nvSpPr>
+            <p:cNvPr id="27" name="TextBox 26">
+              <a:extLst>
+                <a:ext uri="{FF2B5EF4-FFF2-40B4-BE49-F238E27FC236}">
+                  <a16:creationId xmlns:a16="http://schemas.microsoft.com/office/drawing/2014/main" id="{1F719E16-7A4D-4E99-92C6-1E1F0A6D15CD}"/>
+                </a:ext>
+              </a:extLst>
+            </p:cNvPr>
+            <p:cNvSpPr txBox="1"/>
+            <p:nvPr/>
+          </p:nvSpPr>
+          <p:spPr>
+            <a:xfrm>
+              <a:off x="10559475" y="1497981"/>
+              <a:ext cx="231227" cy="307777"/>
+            </a:xfrm>
+            <a:prstGeom prst="rect">
+              <a:avLst/>
+            </a:prstGeom>
+            <a:noFill/>
+          </p:spPr>
+          <p:txBody>
+            <a:bodyPr wrap="square" rtlCol="0">
+              <a:spAutoFit/>
+            </a:bodyPr>
+            <a:lstStyle/>
+            <a:p>
+              <a:r>
+                <a:rPr lang="en-US" sz="1400" dirty="0">
+                  <a:latin typeface="Helvetica" panose="020B0604020202020204" pitchFamily="34" charset="0"/>
+                  <a:cs typeface="Helvetica" panose="020B0604020202020204" pitchFamily="34" charset="0"/>
+                </a:rPr>
+                <a:t>3</a:t>
+              </a:r>
+            </a:p>
+          </p:txBody>
+        </p:sp>
+        <p:sp>
+          <p:nvSpPr>
+            <p:cNvPr id="28" name="TextBox 27">
+              <a:extLst>
+                <a:ext uri="{FF2B5EF4-FFF2-40B4-BE49-F238E27FC236}">
+                  <a16:creationId xmlns:a16="http://schemas.microsoft.com/office/drawing/2014/main" id="{7E7690C4-5413-45FF-9040-635FFA2AD24E}"/>
+                </a:ext>
+              </a:extLst>
+            </p:cNvPr>
+            <p:cNvSpPr txBox="1"/>
+            <p:nvPr/>
+          </p:nvSpPr>
+          <p:spPr>
+            <a:xfrm>
+              <a:off x="10853153" y="1497981"/>
+              <a:ext cx="231227" cy="307777"/>
+            </a:xfrm>
+            <a:prstGeom prst="rect">
+              <a:avLst/>
+            </a:prstGeom>
+            <a:noFill/>
+          </p:spPr>
+          <p:txBody>
+            <a:bodyPr wrap="square" rtlCol="0">
+              <a:spAutoFit/>
+            </a:bodyPr>
+            <a:lstStyle/>
+            <a:p>
+              <a:r>
+                <a:rPr lang="en-US" sz="1400" dirty="0">
+                  <a:latin typeface="Helvetica" panose="020B0604020202020204" pitchFamily="34" charset="0"/>
+                  <a:cs typeface="Helvetica" panose="020B0604020202020204" pitchFamily="34" charset="0"/>
+                </a:rPr>
+                <a:t>8</a:t>
+              </a:r>
+            </a:p>
+          </p:txBody>
+        </p:sp>
+        <p:sp>
+          <p:nvSpPr>
+            <p:cNvPr id="29" name="TextBox 28">
+              <a:extLst>
+                <a:ext uri="{FF2B5EF4-FFF2-40B4-BE49-F238E27FC236}">
+                  <a16:creationId xmlns:a16="http://schemas.microsoft.com/office/drawing/2014/main" id="{95602401-8014-435F-BC5D-9BC6400F51EA}"/>
+                </a:ext>
+              </a:extLst>
+            </p:cNvPr>
+            <p:cNvSpPr txBox="1"/>
+            <p:nvPr/>
+          </p:nvSpPr>
+          <p:spPr>
+            <a:xfrm>
+              <a:off x="11146831" y="1497981"/>
+              <a:ext cx="231227" cy="307777"/>
+            </a:xfrm>
+            <a:prstGeom prst="rect">
+              <a:avLst/>
+            </a:prstGeom>
+            <a:noFill/>
+          </p:spPr>
+          <p:txBody>
+            <a:bodyPr wrap="square" rtlCol="0">
+              <a:spAutoFit/>
+            </a:bodyPr>
+            <a:lstStyle/>
+            <a:p>
+              <a:r>
+                <a:rPr lang="en-US" sz="1400" dirty="0">
+                  <a:latin typeface="Helvetica" panose="020B0604020202020204" pitchFamily="34" charset="0"/>
+                  <a:cs typeface="Helvetica" panose="020B0604020202020204" pitchFamily="34" charset="0"/>
+                </a:rPr>
+                <a:t>1</a:t>
+              </a:r>
+            </a:p>
+          </p:txBody>
+        </p:sp>
+        <p:sp>
+          <p:nvSpPr>
+            <p:cNvPr id="30" name="TextBox 29">
+              <a:extLst>
+                <a:ext uri="{FF2B5EF4-FFF2-40B4-BE49-F238E27FC236}">
+                  <a16:creationId xmlns:a16="http://schemas.microsoft.com/office/drawing/2014/main" id="{0F394F95-EDDB-4768-A6B9-D8DE15D0125D}"/>
+                </a:ext>
+              </a:extLst>
+            </p:cNvPr>
+            <p:cNvSpPr txBox="1"/>
+            <p:nvPr/>
+          </p:nvSpPr>
+          <p:spPr>
+            <a:xfrm>
+              <a:off x="8157501" y="1497981"/>
+              <a:ext cx="231227" cy="307777"/>
+            </a:xfrm>
+            <a:prstGeom prst="rect">
+              <a:avLst/>
+            </a:prstGeom>
+            <a:noFill/>
+          </p:spPr>
+          <p:txBody>
+            <a:bodyPr wrap="square" rtlCol="0">
+              <a:spAutoFit/>
+            </a:bodyPr>
+            <a:lstStyle/>
+            <a:p>
+              <a:r>
+                <a:rPr lang="en-US" sz="1400" dirty="0">
+                  <a:latin typeface="Helvetica" panose="020B0604020202020204" pitchFamily="34" charset="0"/>
+                  <a:cs typeface="Helvetica" panose="020B0604020202020204" pitchFamily="34" charset="0"/>
+                </a:rPr>
+                <a:t>1</a:t>
+              </a:r>
+            </a:p>
+          </p:txBody>
+        </p:sp>
+        <p:sp>
+          <p:nvSpPr>
+            <p:cNvPr id="31" name="TextBox 30">
+              <a:extLst>
+                <a:ext uri="{FF2B5EF4-FFF2-40B4-BE49-F238E27FC236}">
+                  <a16:creationId xmlns:a16="http://schemas.microsoft.com/office/drawing/2014/main" id="{8C91ACB8-8F46-4AC9-8BD6-D860D159166B}"/>
+                </a:ext>
+              </a:extLst>
+            </p:cNvPr>
+            <p:cNvSpPr txBox="1"/>
+            <p:nvPr/>
+          </p:nvSpPr>
+          <p:spPr>
+            <a:xfrm>
+              <a:off x="8430159" y="1497981"/>
+              <a:ext cx="231227" cy="307777"/>
+            </a:xfrm>
+            <a:prstGeom prst="rect">
+              <a:avLst/>
+            </a:prstGeom>
+            <a:noFill/>
+          </p:spPr>
+          <p:txBody>
+            <a:bodyPr wrap="square" rtlCol="0">
+              <a:spAutoFit/>
+            </a:bodyPr>
+            <a:lstStyle/>
+            <a:p>
+              <a:r>
+                <a:rPr lang="en-US" sz="1400" dirty="0">
+                  <a:latin typeface="Helvetica" panose="020B0604020202020204" pitchFamily="34" charset="0"/>
+                  <a:cs typeface="Helvetica" panose="020B0604020202020204" pitchFamily="34" charset="0"/>
+                </a:rPr>
+                <a:t>1</a:t>
+              </a:r>
+            </a:p>
+          </p:txBody>
+        </p:sp>
+        <p:sp>
+          <p:nvSpPr>
+            <p:cNvPr id="32" name="TextBox 31">
+              <a:extLst>
+                <a:ext uri="{FF2B5EF4-FFF2-40B4-BE49-F238E27FC236}">
+                  <a16:creationId xmlns:a16="http://schemas.microsoft.com/office/drawing/2014/main" id="{C20E3C3C-F9A6-46BC-B4D2-8A5A604D091F}"/>
+                </a:ext>
+              </a:extLst>
+            </p:cNvPr>
+            <p:cNvSpPr txBox="1"/>
+            <p:nvPr/>
+          </p:nvSpPr>
+          <p:spPr>
+            <a:xfrm>
+              <a:off x="8702817" y="1497981"/>
+              <a:ext cx="231227" cy="307777"/>
+            </a:xfrm>
+            <a:prstGeom prst="rect">
+              <a:avLst/>
+            </a:prstGeom>
+            <a:noFill/>
+          </p:spPr>
+          <p:txBody>
+            <a:bodyPr wrap="square" rtlCol="0">
+              <a:spAutoFit/>
+            </a:bodyPr>
+            <a:lstStyle/>
+            <a:p>
+              <a:r>
+                <a:rPr lang="en-US" sz="1400" dirty="0">
+                  <a:latin typeface="Helvetica" panose="020B0604020202020204" pitchFamily="34" charset="0"/>
+                  <a:cs typeface="Helvetica" panose="020B0604020202020204" pitchFamily="34" charset="0"/>
+                </a:rPr>
+                <a:t>1</a:t>
+              </a:r>
+            </a:p>
+          </p:txBody>
+        </p:sp>
+        <p:sp>
+          <p:nvSpPr>
+            <p:cNvPr id="33" name="TextBox 32">
+              <a:extLst>
+                <a:ext uri="{FF2B5EF4-FFF2-40B4-BE49-F238E27FC236}">
+                  <a16:creationId xmlns:a16="http://schemas.microsoft.com/office/drawing/2014/main" id="{1FDE3411-C288-46F7-A444-4566E4A8069D}"/>
+                </a:ext>
+              </a:extLst>
+            </p:cNvPr>
+            <p:cNvSpPr txBox="1"/>
+            <p:nvPr/>
+          </p:nvSpPr>
+          <p:spPr>
+            <a:xfrm>
+              <a:off x="8985985" y="1497981"/>
+              <a:ext cx="231227" cy="307777"/>
+            </a:xfrm>
+            <a:prstGeom prst="rect">
+              <a:avLst/>
+            </a:prstGeom>
+            <a:noFill/>
+          </p:spPr>
+          <p:txBody>
+            <a:bodyPr wrap="square" rtlCol="0">
+              <a:spAutoFit/>
+            </a:bodyPr>
+            <a:lstStyle/>
+            <a:p>
+              <a:r>
+                <a:rPr lang="en-US" sz="1400" dirty="0">
+                  <a:latin typeface="Helvetica" panose="020B0604020202020204" pitchFamily="34" charset="0"/>
+                  <a:cs typeface="Helvetica" panose="020B0604020202020204" pitchFamily="34" charset="0"/>
+                </a:rPr>
+                <a:t>1</a:t>
+              </a:r>
+            </a:p>
+          </p:txBody>
+        </p:sp>
+        <p:sp>
+          <p:nvSpPr>
+            <p:cNvPr id="34" name="TextBox 33">
+              <a:extLst>
+                <a:ext uri="{FF2B5EF4-FFF2-40B4-BE49-F238E27FC236}">
+                  <a16:creationId xmlns:a16="http://schemas.microsoft.com/office/drawing/2014/main" id="{953260AB-6588-4B25-BA84-08CCE53116A6}"/>
+                </a:ext>
+              </a:extLst>
+            </p:cNvPr>
+            <p:cNvSpPr txBox="1"/>
+            <p:nvPr/>
+          </p:nvSpPr>
+          <p:spPr>
+            <a:xfrm>
+              <a:off x="9279663" y="1497981"/>
+              <a:ext cx="231227" cy="307777"/>
+            </a:xfrm>
+            <a:prstGeom prst="rect">
+              <a:avLst/>
+            </a:prstGeom>
+            <a:noFill/>
+          </p:spPr>
+          <p:txBody>
+            <a:bodyPr wrap="square" rtlCol="0">
+              <a:spAutoFit/>
+            </a:bodyPr>
+            <a:lstStyle/>
+            <a:p>
+              <a:r>
+                <a:rPr lang="en-US" sz="1400" dirty="0">
+                  <a:latin typeface="Helvetica" panose="020B0604020202020204" pitchFamily="34" charset="0"/>
+                  <a:cs typeface="Helvetica" panose="020B0604020202020204" pitchFamily="34" charset="0"/>
+                </a:rPr>
+                <a:t>1</a:t>
+              </a:r>
+            </a:p>
+          </p:txBody>
+        </p:sp>
+        <p:sp>
+          <p:nvSpPr>
+            <p:cNvPr id="35" name="TextBox 34">
+              <a:extLst>
+                <a:ext uri="{FF2B5EF4-FFF2-40B4-BE49-F238E27FC236}">
+                  <a16:creationId xmlns:a16="http://schemas.microsoft.com/office/drawing/2014/main" id="{217B7C3C-D6FE-4715-A7C2-1948B1142F1A}"/>
+                </a:ext>
+              </a:extLst>
+            </p:cNvPr>
+            <p:cNvSpPr txBox="1"/>
+            <p:nvPr/>
+          </p:nvSpPr>
+          <p:spPr>
+            <a:xfrm>
+              <a:off x="9583850" y="1497981"/>
+              <a:ext cx="231227" cy="307777"/>
+            </a:xfrm>
+            <a:prstGeom prst="rect">
+              <a:avLst/>
+            </a:prstGeom>
+            <a:noFill/>
+          </p:spPr>
+          <p:txBody>
+            <a:bodyPr wrap="square" rtlCol="0">
+              <a:spAutoFit/>
+            </a:bodyPr>
+            <a:lstStyle/>
+            <a:p>
+              <a:r>
+                <a:rPr lang="en-US" sz="1400" dirty="0">
+                  <a:latin typeface="Helvetica" panose="020B0604020202020204" pitchFamily="34" charset="0"/>
+                  <a:cs typeface="Helvetica" panose="020B0604020202020204" pitchFamily="34" charset="0"/>
+                </a:rPr>
+                <a:t>1</a:t>
+              </a:r>
+            </a:p>
+          </p:txBody>
+        </p:sp>
+        <p:sp>
+          <p:nvSpPr>
+            <p:cNvPr id="36" name="TextBox 35">
+              <a:extLst>
+                <a:ext uri="{FF2B5EF4-FFF2-40B4-BE49-F238E27FC236}">
+                  <a16:creationId xmlns:a16="http://schemas.microsoft.com/office/drawing/2014/main" id="{B6FCCBAA-9344-4116-BDFD-65F4CB4494AE}"/>
+                </a:ext>
+              </a:extLst>
+            </p:cNvPr>
+            <p:cNvSpPr txBox="1"/>
+            <p:nvPr/>
+          </p:nvSpPr>
+          <p:spPr>
+            <a:xfrm>
+              <a:off x="6584006" y="1497981"/>
+              <a:ext cx="231227" cy="307777"/>
+            </a:xfrm>
+            <a:prstGeom prst="rect">
+              <a:avLst/>
+            </a:prstGeom>
+            <a:noFill/>
+          </p:spPr>
+          <p:txBody>
+            <a:bodyPr wrap="square" rtlCol="0">
+              <a:spAutoFit/>
+            </a:bodyPr>
+            <a:lstStyle/>
+            <a:p>
+              <a:r>
+                <a:rPr lang="en-US" sz="1400" dirty="0">
+                  <a:latin typeface="Helvetica" panose="020B0604020202020204" pitchFamily="34" charset="0"/>
+                  <a:cs typeface="Helvetica" panose="020B0604020202020204" pitchFamily="34" charset="0"/>
+                </a:rPr>
+                <a:t>1</a:t>
+              </a:r>
+            </a:p>
+          </p:txBody>
+        </p:sp>
+        <p:sp>
+          <p:nvSpPr>
+            <p:cNvPr id="37" name="TextBox 36">
+              <a:extLst>
+                <a:ext uri="{FF2B5EF4-FFF2-40B4-BE49-F238E27FC236}">
+                  <a16:creationId xmlns:a16="http://schemas.microsoft.com/office/drawing/2014/main" id="{87F39348-6FA6-416D-82DA-9FD3D4FA0A25}"/>
+                </a:ext>
+              </a:extLst>
+            </p:cNvPr>
+            <p:cNvSpPr txBox="1"/>
+            <p:nvPr/>
+          </p:nvSpPr>
+          <p:spPr>
+            <a:xfrm>
+              <a:off x="6993299" y="1497981"/>
+              <a:ext cx="231227" cy="307777"/>
+            </a:xfrm>
+            <a:prstGeom prst="rect">
+              <a:avLst/>
+            </a:prstGeom>
+            <a:noFill/>
+          </p:spPr>
+          <p:txBody>
+            <a:bodyPr wrap="square" rtlCol="0">
+              <a:spAutoFit/>
+            </a:bodyPr>
+            <a:lstStyle/>
+            <a:p>
+              <a:r>
+                <a:rPr lang="en-US" sz="1400" dirty="0">
+                  <a:latin typeface="Helvetica" panose="020B0604020202020204" pitchFamily="34" charset="0"/>
+                  <a:cs typeface="Helvetica" panose="020B0604020202020204" pitchFamily="34" charset="0"/>
+                </a:rPr>
+                <a:t>5</a:t>
+              </a:r>
+            </a:p>
+          </p:txBody>
+        </p:sp>
+        <p:sp>
+          <p:nvSpPr>
+            <p:cNvPr id="38" name="TextBox 37">
+              <a:extLst>
+                <a:ext uri="{FF2B5EF4-FFF2-40B4-BE49-F238E27FC236}">
+                  <a16:creationId xmlns:a16="http://schemas.microsoft.com/office/drawing/2014/main" id="{37A42EFF-EB86-4130-A232-5C9795FF9785}"/>
+                </a:ext>
+              </a:extLst>
+            </p:cNvPr>
+            <p:cNvSpPr txBox="1"/>
+            <p:nvPr/>
+          </p:nvSpPr>
+          <p:spPr>
+            <a:xfrm>
+              <a:off x="7863823" y="1497981"/>
+              <a:ext cx="231227" cy="307777"/>
+            </a:xfrm>
+            <a:prstGeom prst="rect">
+              <a:avLst/>
+            </a:prstGeom>
+            <a:noFill/>
+          </p:spPr>
+          <p:txBody>
+            <a:bodyPr wrap="square" rtlCol="0">
+              <a:spAutoFit/>
+            </a:bodyPr>
+            <a:lstStyle/>
+            <a:p>
+              <a:r>
+                <a:rPr lang="en-US" sz="1400" dirty="0">
+                  <a:latin typeface="Helvetica" panose="020B0604020202020204" pitchFamily="34" charset="0"/>
+                  <a:cs typeface="Helvetica" panose="020B0604020202020204" pitchFamily="34" charset="0"/>
+                </a:rPr>
+                <a:t>1</a:t>
+              </a:r>
+            </a:p>
+          </p:txBody>
+        </p:sp>
+        <p:sp>
+          <p:nvSpPr>
+            <p:cNvPr id="39" name="TextBox 38">
+              <a:extLst>
+                <a:ext uri="{FF2B5EF4-FFF2-40B4-BE49-F238E27FC236}">
+                  <a16:creationId xmlns:a16="http://schemas.microsoft.com/office/drawing/2014/main" id="{44A2A77B-3F3A-4BF4-9F7B-A4595EAB5F07}"/>
+                </a:ext>
+              </a:extLst>
+            </p:cNvPr>
+            <p:cNvSpPr txBox="1"/>
+            <p:nvPr/>
+          </p:nvSpPr>
+          <p:spPr>
+            <a:xfrm>
+              <a:off x="7276467" y="1497981"/>
+              <a:ext cx="231227" cy="307777"/>
+            </a:xfrm>
+            <a:prstGeom prst="rect">
+              <a:avLst/>
+            </a:prstGeom>
+            <a:noFill/>
+          </p:spPr>
+          <p:txBody>
+            <a:bodyPr wrap="square" rtlCol="0">
+              <a:spAutoFit/>
+            </a:bodyPr>
+            <a:lstStyle/>
+            <a:p>
+              <a:r>
+                <a:rPr lang="en-US" sz="1400" dirty="0">
+                  <a:latin typeface="Helvetica" panose="020B0604020202020204" pitchFamily="34" charset="0"/>
+                  <a:cs typeface="Helvetica" panose="020B0604020202020204" pitchFamily="34" charset="0"/>
+                </a:rPr>
+                <a:t>1</a:t>
+              </a:r>
+            </a:p>
+          </p:txBody>
+        </p:sp>
+        <p:sp>
+          <p:nvSpPr>
+            <p:cNvPr id="40" name="TextBox 39">
+              <a:extLst>
+                <a:ext uri="{FF2B5EF4-FFF2-40B4-BE49-F238E27FC236}">
+                  <a16:creationId xmlns:a16="http://schemas.microsoft.com/office/drawing/2014/main" id="{F7E5E748-02ED-44CA-85DA-B0164E54541D}"/>
+                </a:ext>
+              </a:extLst>
+            </p:cNvPr>
+            <p:cNvSpPr txBox="1"/>
+            <p:nvPr/>
+          </p:nvSpPr>
+          <p:spPr>
+            <a:xfrm>
+              <a:off x="7580655" y="1497981"/>
+              <a:ext cx="231227" cy="307777"/>
+            </a:xfrm>
+            <a:prstGeom prst="rect">
+              <a:avLst/>
+            </a:prstGeom>
+            <a:noFill/>
+          </p:spPr>
+          <p:txBody>
+            <a:bodyPr wrap="square" rtlCol="0">
+              <a:spAutoFit/>
+            </a:bodyPr>
+            <a:lstStyle/>
+            <a:p>
+              <a:r>
+                <a:rPr lang="en-US" sz="1400" dirty="0">
+                  <a:latin typeface="Helvetica" panose="020B0604020202020204" pitchFamily="34" charset="0"/>
+                  <a:cs typeface="Helvetica" panose="020B0604020202020204" pitchFamily="34" charset="0"/>
+                </a:rPr>
+                <a:t>1</a:t>
+              </a:r>
+            </a:p>
+          </p:txBody>
+        </p:sp>
+        <p:sp>
+          <p:nvSpPr>
+            <p:cNvPr id="42" name="TextBox 41">
+              <a:extLst>
+                <a:ext uri="{FF2B5EF4-FFF2-40B4-BE49-F238E27FC236}">
+                  <a16:creationId xmlns:a16="http://schemas.microsoft.com/office/drawing/2014/main" id="{77315151-42B9-4A3D-BC2C-3D0CD8CC32FE}"/>
+                </a:ext>
+              </a:extLst>
+            </p:cNvPr>
+            <p:cNvSpPr txBox="1"/>
+            <p:nvPr/>
+          </p:nvSpPr>
+          <p:spPr>
+            <a:xfrm>
+              <a:off x="6290329" y="1497981"/>
+              <a:ext cx="231227" cy="307777"/>
+            </a:xfrm>
+            <a:prstGeom prst="rect">
+              <a:avLst/>
+            </a:prstGeom>
+            <a:noFill/>
+          </p:spPr>
+          <p:txBody>
+            <a:bodyPr wrap="square" rtlCol="0">
+              <a:spAutoFit/>
+            </a:bodyPr>
+            <a:lstStyle/>
+            <a:p>
+              <a:r>
+                <a:rPr lang="en-US" sz="1400" dirty="0">
+                  <a:latin typeface="Helvetica" panose="020B0604020202020204" pitchFamily="34" charset="0"/>
+                  <a:cs typeface="Helvetica" panose="020B0604020202020204" pitchFamily="34" charset="0"/>
+                </a:rPr>
+                <a:t>1</a:t>
+              </a:r>
+            </a:p>
+          </p:txBody>
+        </p:sp>
+      </p:grpSp>
     </p:spTree>
     <p:extLst>
       <p:ext uri="{BB962C8B-B14F-4D97-AF65-F5344CB8AC3E}">
         <p14:creationId xmlns:p14="http://schemas.microsoft.com/office/powerpoint/2010/main" val="3945188910"/>
+      </p:ext>
+    </p:extLst>
+  </p:cSld>
+  <p:clrMapOvr>
+    <a:masterClrMapping/>
+  </p:clrMapOvr>
+</p:sld>
+</file>
+
+<file path=ppt/slides/slide2.xml><?xml version="1.0" encoding="utf-8"?>
+<p:sld xmlns:a="http://schemas.openxmlformats.org/drawingml/2006/main" xmlns:r="http://schemas.openxmlformats.org/officeDocument/2006/relationships" xmlns:p="http://schemas.openxmlformats.org/presentationml/2006/main">
+  <p:cSld>
+    <p:spTree>
+      <p:nvGrpSpPr>
+        <p:cNvPr id="1" name=""/>
+        <p:cNvGrpSpPr/>
+        <p:nvPr/>
+      </p:nvGrpSpPr>
+      <p:grpSpPr>
+        <a:xfrm>
+          <a:off x="0" y="0"/>
+          <a:ext cx="0" cy="0"/>
+          <a:chOff x="0" y="0"/>
+          <a:chExt cx="0" cy="0"/>
+        </a:xfrm>
+      </p:grpSpPr>
+      <p:grpSp>
+        <p:nvGrpSpPr>
+          <p:cNvPr id="42" name="Group 41">
+            <a:extLst>
+              <a:ext uri="{FF2B5EF4-FFF2-40B4-BE49-F238E27FC236}">
+                <a16:creationId xmlns:a16="http://schemas.microsoft.com/office/drawing/2014/main" id="{801F80F2-C102-4C73-8EF7-93AE298E7307}"/>
+              </a:ext>
+            </a:extLst>
+          </p:cNvPr>
+          <p:cNvGrpSpPr/>
+          <p:nvPr/>
+        </p:nvGrpSpPr>
+        <p:grpSpPr>
+          <a:xfrm>
+            <a:off x="607262" y="1790436"/>
+            <a:ext cx="11290341" cy="3277127"/>
+            <a:chOff x="607262" y="1790436"/>
+            <a:chExt cx="11290341" cy="3277127"/>
+          </a:xfrm>
+        </p:grpSpPr>
+        <p:pic>
+          <p:nvPicPr>
+            <p:cNvPr id="5" name="Picture 4" descr="Chart, histogram&#10;&#10;Description automatically generated">
+              <a:extLst>
+                <a:ext uri="{FF2B5EF4-FFF2-40B4-BE49-F238E27FC236}">
+                  <a16:creationId xmlns:a16="http://schemas.microsoft.com/office/drawing/2014/main" id="{ADFB2316-4DB0-49C3-8305-C0E7CD9D3640}"/>
+                </a:ext>
+              </a:extLst>
+            </p:cNvPr>
+            <p:cNvPicPr>
+              <a:picLocks noChangeAspect="1"/>
+            </p:cNvPicPr>
+            <p:nvPr/>
+          </p:nvPicPr>
+          <p:blipFill rotWithShape="1">
+            <a:blip r:embed="rId2">
+              <a:extLst>
+                <a:ext uri="{28A0092B-C50C-407E-A947-70E740481C1C}">
+                  <a14:useLocalDpi xmlns:a14="http://schemas.microsoft.com/office/drawing/2010/main" val="0"/>
+                </a:ext>
+              </a:extLst>
+            </a:blip>
+            <a:srcRect t="12873"/>
+            <a:stretch/>
+          </p:blipFill>
+          <p:spPr>
+            <a:xfrm>
+              <a:off x="607262" y="1790436"/>
+              <a:ext cx="11290341" cy="3277127"/>
+            </a:xfrm>
+            <a:prstGeom prst="rect">
+              <a:avLst/>
+            </a:prstGeom>
+          </p:spPr>
+        </p:pic>
+        <p:sp>
+          <p:nvSpPr>
+            <p:cNvPr id="6" name="TextBox 5">
+              <a:extLst>
+                <a:ext uri="{FF2B5EF4-FFF2-40B4-BE49-F238E27FC236}">
+                  <a16:creationId xmlns:a16="http://schemas.microsoft.com/office/drawing/2014/main" id="{91BFF07C-C82E-4213-9635-B2B7F7927B1C}"/>
+                </a:ext>
+              </a:extLst>
+            </p:cNvPr>
+            <p:cNvSpPr txBox="1"/>
+            <p:nvPr/>
+          </p:nvSpPr>
+          <p:spPr>
+            <a:xfrm>
+              <a:off x="872935" y="4104536"/>
+              <a:ext cx="231227" cy="338554"/>
+            </a:xfrm>
+            <a:prstGeom prst="rect">
+              <a:avLst/>
+            </a:prstGeom>
+            <a:noFill/>
+          </p:spPr>
+          <p:txBody>
+            <a:bodyPr wrap="square" rtlCol="0">
+              <a:spAutoFit/>
+            </a:bodyPr>
+            <a:lstStyle/>
+            <a:p>
+              <a:r>
+                <a:rPr lang="en-US" sz="1600" b="1" dirty="0">
+                  <a:solidFill>
+                    <a:schemeClr val="bg1"/>
+                  </a:solidFill>
+                  <a:latin typeface="Helvetica" panose="020B0604020202020204" pitchFamily="34" charset="0"/>
+                  <a:cs typeface="Helvetica" panose="020B0604020202020204" pitchFamily="34" charset="0"/>
+                </a:rPr>
+                <a:t>8</a:t>
+              </a:r>
+            </a:p>
+          </p:txBody>
+        </p:sp>
+        <p:sp>
+          <p:nvSpPr>
+            <p:cNvPr id="7" name="TextBox 6">
+              <a:extLst>
+                <a:ext uri="{FF2B5EF4-FFF2-40B4-BE49-F238E27FC236}">
+                  <a16:creationId xmlns:a16="http://schemas.microsoft.com/office/drawing/2014/main" id="{33E00DC9-0F82-4322-AD56-41E5E18834C4}"/>
+                </a:ext>
+              </a:extLst>
+            </p:cNvPr>
+            <p:cNvSpPr txBox="1"/>
+            <p:nvPr/>
+          </p:nvSpPr>
+          <p:spPr>
+            <a:xfrm>
+              <a:off x="1114063" y="4104536"/>
+              <a:ext cx="520071" cy="338554"/>
+            </a:xfrm>
+            <a:prstGeom prst="rect">
+              <a:avLst/>
+            </a:prstGeom>
+            <a:noFill/>
+          </p:spPr>
+          <p:txBody>
+            <a:bodyPr wrap="square" rtlCol="0">
+              <a:spAutoFit/>
+            </a:bodyPr>
+            <a:lstStyle/>
+            <a:p>
+              <a:r>
+                <a:rPr lang="en-US" sz="1600" b="1" dirty="0">
+                  <a:solidFill>
+                    <a:schemeClr val="bg1"/>
+                  </a:solidFill>
+                  <a:latin typeface="Helvetica" panose="020B0604020202020204" pitchFamily="34" charset="0"/>
+                  <a:cs typeface="Helvetica" panose="020B0604020202020204" pitchFamily="34" charset="0"/>
+                </a:rPr>
+                <a:t>20</a:t>
+              </a:r>
+            </a:p>
+          </p:txBody>
+        </p:sp>
+        <p:sp>
+          <p:nvSpPr>
+            <p:cNvPr id="8" name="TextBox 7">
+              <a:extLst>
+                <a:ext uri="{FF2B5EF4-FFF2-40B4-BE49-F238E27FC236}">
+                  <a16:creationId xmlns:a16="http://schemas.microsoft.com/office/drawing/2014/main" id="{76EFB936-C9E4-42EB-BFA7-EB52F8B564FB}"/>
+                </a:ext>
+              </a:extLst>
+            </p:cNvPr>
+            <p:cNvSpPr txBox="1"/>
+            <p:nvPr/>
+          </p:nvSpPr>
+          <p:spPr>
+            <a:xfrm>
+              <a:off x="1455152" y="4104536"/>
+              <a:ext cx="231227" cy="338554"/>
+            </a:xfrm>
+            <a:prstGeom prst="rect">
+              <a:avLst/>
+            </a:prstGeom>
+            <a:noFill/>
+          </p:spPr>
+          <p:txBody>
+            <a:bodyPr wrap="square" rtlCol="0">
+              <a:spAutoFit/>
+            </a:bodyPr>
+            <a:lstStyle/>
+            <a:p>
+              <a:r>
+                <a:rPr lang="en-US" sz="1600" b="1" dirty="0">
+                  <a:solidFill>
+                    <a:schemeClr val="bg1"/>
+                  </a:solidFill>
+                  <a:latin typeface="Helvetica" panose="020B0604020202020204" pitchFamily="34" charset="0"/>
+                  <a:cs typeface="Helvetica" panose="020B0604020202020204" pitchFamily="34" charset="0"/>
+                </a:rPr>
+                <a:t>6</a:t>
+              </a:r>
+            </a:p>
+          </p:txBody>
+        </p:sp>
+        <p:sp>
+          <p:nvSpPr>
+            <p:cNvPr id="9" name="TextBox 8">
+              <a:extLst>
+                <a:ext uri="{FF2B5EF4-FFF2-40B4-BE49-F238E27FC236}">
+                  <a16:creationId xmlns:a16="http://schemas.microsoft.com/office/drawing/2014/main" id="{20909506-64F3-4ED5-A224-90E92E743167}"/>
+                </a:ext>
+              </a:extLst>
+            </p:cNvPr>
+            <p:cNvSpPr txBox="1"/>
+            <p:nvPr/>
+          </p:nvSpPr>
+          <p:spPr>
+            <a:xfrm>
+              <a:off x="2148429" y="4104536"/>
+              <a:ext cx="231227" cy="338554"/>
+            </a:xfrm>
+            <a:prstGeom prst="rect">
+              <a:avLst/>
+            </a:prstGeom>
+            <a:noFill/>
+          </p:spPr>
+          <p:txBody>
+            <a:bodyPr wrap="square" rtlCol="0">
+              <a:spAutoFit/>
+            </a:bodyPr>
+            <a:lstStyle/>
+            <a:p>
+              <a:r>
+                <a:rPr lang="en-US" sz="1600" b="1" dirty="0">
+                  <a:solidFill>
+                    <a:schemeClr val="bg1"/>
+                  </a:solidFill>
+                  <a:latin typeface="Helvetica" panose="020B0604020202020204" pitchFamily="34" charset="0"/>
+                  <a:cs typeface="Helvetica" panose="020B0604020202020204" pitchFamily="34" charset="0"/>
+                </a:rPr>
+                <a:t>1</a:t>
+              </a:r>
+            </a:p>
+          </p:txBody>
+        </p:sp>
+        <p:sp>
+          <p:nvSpPr>
+            <p:cNvPr id="10" name="TextBox 9">
+              <a:extLst>
+                <a:ext uri="{FF2B5EF4-FFF2-40B4-BE49-F238E27FC236}">
+                  <a16:creationId xmlns:a16="http://schemas.microsoft.com/office/drawing/2014/main" id="{F3BC8AE4-1F02-487B-A4FB-CA0032FCAE0D}"/>
+                </a:ext>
+              </a:extLst>
+            </p:cNvPr>
+            <p:cNvSpPr txBox="1"/>
+            <p:nvPr/>
+          </p:nvSpPr>
+          <p:spPr>
+            <a:xfrm>
+              <a:off x="1874649" y="4104536"/>
+              <a:ext cx="231227" cy="338554"/>
+            </a:xfrm>
+            <a:prstGeom prst="rect">
+              <a:avLst/>
+            </a:prstGeom>
+            <a:noFill/>
+          </p:spPr>
+          <p:txBody>
+            <a:bodyPr wrap="square" rtlCol="0">
+              <a:spAutoFit/>
+            </a:bodyPr>
+            <a:lstStyle/>
+            <a:p>
+              <a:r>
+                <a:rPr lang="en-US" sz="1600" b="1" dirty="0">
+                  <a:solidFill>
+                    <a:schemeClr val="bg1"/>
+                  </a:solidFill>
+                  <a:latin typeface="Helvetica" panose="020B0604020202020204" pitchFamily="34" charset="0"/>
+                  <a:cs typeface="Helvetica" panose="020B0604020202020204" pitchFamily="34" charset="0"/>
+                </a:rPr>
+                <a:t>1</a:t>
+              </a:r>
+            </a:p>
+          </p:txBody>
+        </p:sp>
+        <p:sp>
+          <p:nvSpPr>
+            <p:cNvPr id="11" name="TextBox 10">
+              <a:extLst>
+                <a:ext uri="{FF2B5EF4-FFF2-40B4-BE49-F238E27FC236}">
+                  <a16:creationId xmlns:a16="http://schemas.microsoft.com/office/drawing/2014/main" id="{BA04F398-4E89-4386-9590-84794F973AB4}"/>
+                </a:ext>
+              </a:extLst>
+            </p:cNvPr>
+            <p:cNvSpPr txBox="1"/>
+            <p:nvPr/>
+          </p:nvSpPr>
+          <p:spPr>
+            <a:xfrm>
+              <a:off x="2755685" y="4104536"/>
+              <a:ext cx="231227" cy="338554"/>
+            </a:xfrm>
+            <a:prstGeom prst="rect">
+              <a:avLst/>
+            </a:prstGeom>
+            <a:noFill/>
+          </p:spPr>
+          <p:txBody>
+            <a:bodyPr wrap="square" rtlCol="0">
+              <a:spAutoFit/>
+            </a:bodyPr>
+            <a:lstStyle/>
+            <a:p>
+              <a:r>
+                <a:rPr lang="en-US" sz="1600" b="1" dirty="0">
+                  <a:solidFill>
+                    <a:schemeClr val="bg1"/>
+                  </a:solidFill>
+                  <a:latin typeface="Helvetica" panose="020B0604020202020204" pitchFamily="34" charset="0"/>
+                  <a:cs typeface="Helvetica" panose="020B0604020202020204" pitchFamily="34" charset="0"/>
+                </a:rPr>
+                <a:t>1</a:t>
+              </a:r>
+            </a:p>
+          </p:txBody>
+        </p:sp>
+        <p:sp>
+          <p:nvSpPr>
+            <p:cNvPr id="12" name="TextBox 11">
+              <a:extLst>
+                <a:ext uri="{FF2B5EF4-FFF2-40B4-BE49-F238E27FC236}">
+                  <a16:creationId xmlns:a16="http://schemas.microsoft.com/office/drawing/2014/main" id="{67ACEB14-7427-453E-B8C0-8F03235ACF3D}"/>
+                </a:ext>
+              </a:extLst>
+            </p:cNvPr>
+            <p:cNvSpPr txBox="1"/>
+            <p:nvPr/>
+          </p:nvSpPr>
+          <p:spPr>
+            <a:xfrm>
+              <a:off x="2462004" y="4104536"/>
+              <a:ext cx="231227" cy="338554"/>
+            </a:xfrm>
+            <a:prstGeom prst="rect">
+              <a:avLst/>
+            </a:prstGeom>
+            <a:noFill/>
+          </p:spPr>
+          <p:txBody>
+            <a:bodyPr wrap="square" rtlCol="0">
+              <a:spAutoFit/>
+            </a:bodyPr>
+            <a:lstStyle/>
+            <a:p>
+              <a:r>
+                <a:rPr lang="en-US" sz="1600" b="1" dirty="0">
+                  <a:solidFill>
+                    <a:schemeClr val="bg1"/>
+                  </a:solidFill>
+                  <a:latin typeface="Helvetica" panose="020B0604020202020204" pitchFamily="34" charset="0"/>
+                  <a:cs typeface="Helvetica" panose="020B0604020202020204" pitchFamily="34" charset="0"/>
+                </a:rPr>
+                <a:t>3</a:t>
+              </a:r>
+            </a:p>
+          </p:txBody>
+        </p:sp>
+        <p:sp>
+          <p:nvSpPr>
+            <p:cNvPr id="13" name="TextBox 12">
+              <a:extLst>
+                <a:ext uri="{FF2B5EF4-FFF2-40B4-BE49-F238E27FC236}">
+                  <a16:creationId xmlns:a16="http://schemas.microsoft.com/office/drawing/2014/main" id="{931AF81A-452E-43F3-8774-EE86524B8AF0}"/>
+                </a:ext>
+              </a:extLst>
+            </p:cNvPr>
+            <p:cNvSpPr txBox="1"/>
+            <p:nvPr/>
+          </p:nvSpPr>
+          <p:spPr>
+            <a:xfrm>
+              <a:off x="3038855" y="4104536"/>
+              <a:ext cx="231227" cy="338554"/>
+            </a:xfrm>
+            <a:prstGeom prst="rect">
+              <a:avLst/>
+            </a:prstGeom>
+            <a:noFill/>
+          </p:spPr>
+          <p:txBody>
+            <a:bodyPr wrap="square" rtlCol="0">
+              <a:spAutoFit/>
+            </a:bodyPr>
+            <a:lstStyle/>
+            <a:p>
+              <a:r>
+                <a:rPr lang="en-US" sz="1600" b="1" dirty="0">
+                  <a:solidFill>
+                    <a:schemeClr val="bg1"/>
+                  </a:solidFill>
+                  <a:latin typeface="Helvetica" panose="020B0604020202020204" pitchFamily="34" charset="0"/>
+                  <a:cs typeface="Helvetica" panose="020B0604020202020204" pitchFamily="34" charset="0"/>
+                </a:rPr>
+                <a:t>1</a:t>
+              </a:r>
+            </a:p>
+          </p:txBody>
+        </p:sp>
+        <p:sp>
+          <p:nvSpPr>
+            <p:cNvPr id="14" name="TextBox 13">
+              <a:extLst>
+                <a:ext uri="{FF2B5EF4-FFF2-40B4-BE49-F238E27FC236}">
+                  <a16:creationId xmlns:a16="http://schemas.microsoft.com/office/drawing/2014/main" id="{6381ADFE-C569-4E2F-9AF7-4A01D4539A0B}"/>
+                </a:ext>
+              </a:extLst>
+            </p:cNvPr>
+            <p:cNvSpPr txBox="1"/>
+            <p:nvPr/>
+          </p:nvSpPr>
+          <p:spPr>
+            <a:xfrm>
+              <a:off x="3311508" y="4104536"/>
+              <a:ext cx="231227" cy="338554"/>
+            </a:xfrm>
+            <a:prstGeom prst="rect">
+              <a:avLst/>
+            </a:prstGeom>
+            <a:noFill/>
+          </p:spPr>
+          <p:txBody>
+            <a:bodyPr wrap="square" rtlCol="0">
+              <a:spAutoFit/>
+            </a:bodyPr>
+            <a:lstStyle/>
+            <a:p>
+              <a:r>
+                <a:rPr lang="en-US" sz="1600" b="1" dirty="0">
+                  <a:solidFill>
+                    <a:schemeClr val="bg1"/>
+                  </a:solidFill>
+                  <a:latin typeface="Helvetica" panose="020B0604020202020204" pitchFamily="34" charset="0"/>
+                  <a:cs typeface="Helvetica" panose="020B0604020202020204" pitchFamily="34" charset="0"/>
+                </a:rPr>
+                <a:t>1</a:t>
+              </a:r>
+            </a:p>
+          </p:txBody>
+        </p:sp>
+        <p:sp>
+          <p:nvSpPr>
+            <p:cNvPr id="15" name="TextBox 14">
+              <a:extLst>
+                <a:ext uri="{FF2B5EF4-FFF2-40B4-BE49-F238E27FC236}">
+                  <a16:creationId xmlns:a16="http://schemas.microsoft.com/office/drawing/2014/main" id="{FFC1E73D-DEBD-4BA1-A4D2-1B9238F2C302}"/>
+                </a:ext>
+              </a:extLst>
+            </p:cNvPr>
+            <p:cNvSpPr txBox="1"/>
+            <p:nvPr/>
+          </p:nvSpPr>
+          <p:spPr>
+            <a:xfrm>
+              <a:off x="3605186" y="4104536"/>
+              <a:ext cx="231227" cy="338554"/>
+            </a:xfrm>
+            <a:prstGeom prst="rect">
+              <a:avLst/>
+            </a:prstGeom>
+            <a:noFill/>
+          </p:spPr>
+          <p:txBody>
+            <a:bodyPr wrap="square" rtlCol="0">
+              <a:spAutoFit/>
+            </a:bodyPr>
+            <a:lstStyle/>
+            <a:p>
+              <a:r>
+                <a:rPr lang="en-US" sz="1600" b="1" dirty="0">
+                  <a:solidFill>
+                    <a:schemeClr val="bg1"/>
+                  </a:solidFill>
+                  <a:latin typeface="Helvetica" panose="020B0604020202020204" pitchFamily="34" charset="0"/>
+                  <a:cs typeface="Helvetica" panose="020B0604020202020204" pitchFamily="34" charset="0"/>
+                </a:rPr>
+                <a:t>1</a:t>
+              </a:r>
+            </a:p>
+          </p:txBody>
+        </p:sp>
+        <p:sp>
+          <p:nvSpPr>
+            <p:cNvPr id="16" name="TextBox 15">
+              <a:extLst>
+                <a:ext uri="{FF2B5EF4-FFF2-40B4-BE49-F238E27FC236}">
+                  <a16:creationId xmlns:a16="http://schemas.microsoft.com/office/drawing/2014/main" id="{65981CB3-0680-43C0-8B61-3363000267F2}"/>
+                </a:ext>
+              </a:extLst>
+            </p:cNvPr>
+            <p:cNvSpPr txBox="1"/>
+            <p:nvPr/>
+          </p:nvSpPr>
+          <p:spPr>
+            <a:xfrm>
+              <a:off x="4182031" y="4104536"/>
+              <a:ext cx="231227" cy="338554"/>
+            </a:xfrm>
+            <a:prstGeom prst="rect">
+              <a:avLst/>
+            </a:prstGeom>
+            <a:noFill/>
+          </p:spPr>
+          <p:txBody>
+            <a:bodyPr wrap="square" rtlCol="0">
+              <a:spAutoFit/>
+            </a:bodyPr>
+            <a:lstStyle/>
+            <a:p>
+              <a:r>
+                <a:rPr lang="en-US" sz="1600" b="1" dirty="0">
+                  <a:solidFill>
+                    <a:schemeClr val="bg1"/>
+                  </a:solidFill>
+                  <a:latin typeface="Helvetica" panose="020B0604020202020204" pitchFamily="34" charset="0"/>
+                  <a:cs typeface="Helvetica" panose="020B0604020202020204" pitchFamily="34" charset="0"/>
+                </a:rPr>
+                <a:t>5</a:t>
+              </a:r>
+            </a:p>
+          </p:txBody>
+        </p:sp>
+        <p:sp>
+          <p:nvSpPr>
+            <p:cNvPr id="17" name="TextBox 16">
+              <a:extLst>
+                <a:ext uri="{FF2B5EF4-FFF2-40B4-BE49-F238E27FC236}">
+                  <a16:creationId xmlns:a16="http://schemas.microsoft.com/office/drawing/2014/main" id="{4F14E7E5-C8AE-4074-82C6-A2DDEC567A96}"/>
+                </a:ext>
+              </a:extLst>
+            </p:cNvPr>
+            <p:cNvSpPr txBox="1"/>
+            <p:nvPr/>
+          </p:nvSpPr>
+          <p:spPr>
+            <a:xfrm>
+              <a:off x="3888353" y="4104536"/>
+              <a:ext cx="231227" cy="338554"/>
+            </a:xfrm>
+            <a:prstGeom prst="rect">
+              <a:avLst/>
+            </a:prstGeom>
+            <a:noFill/>
+          </p:spPr>
+          <p:txBody>
+            <a:bodyPr wrap="square" rtlCol="0">
+              <a:spAutoFit/>
+            </a:bodyPr>
+            <a:lstStyle/>
+            <a:p>
+              <a:r>
+                <a:rPr lang="en-US" sz="1600" b="1" dirty="0">
+                  <a:solidFill>
+                    <a:schemeClr val="bg1"/>
+                  </a:solidFill>
+                  <a:latin typeface="Helvetica" panose="020B0604020202020204" pitchFamily="34" charset="0"/>
+                  <a:cs typeface="Helvetica" panose="020B0604020202020204" pitchFamily="34" charset="0"/>
+                </a:rPr>
+                <a:t>1</a:t>
+              </a:r>
+            </a:p>
+          </p:txBody>
+        </p:sp>
+        <p:sp>
+          <p:nvSpPr>
+            <p:cNvPr id="18" name="TextBox 17">
+              <a:extLst>
+                <a:ext uri="{FF2B5EF4-FFF2-40B4-BE49-F238E27FC236}">
+                  <a16:creationId xmlns:a16="http://schemas.microsoft.com/office/drawing/2014/main" id="{F3A3A623-8F0A-429E-8D6C-6574D9592650}"/>
+                </a:ext>
+              </a:extLst>
+            </p:cNvPr>
+            <p:cNvSpPr txBox="1"/>
+            <p:nvPr/>
+          </p:nvSpPr>
+          <p:spPr>
+            <a:xfrm>
+              <a:off x="4475710" y="4104536"/>
+              <a:ext cx="231227" cy="338554"/>
+            </a:xfrm>
+            <a:prstGeom prst="rect">
+              <a:avLst/>
+            </a:prstGeom>
+            <a:noFill/>
+          </p:spPr>
+          <p:txBody>
+            <a:bodyPr wrap="square" rtlCol="0">
+              <a:spAutoFit/>
+            </a:bodyPr>
+            <a:lstStyle/>
+            <a:p>
+              <a:r>
+                <a:rPr lang="en-US" sz="1600" b="1" dirty="0">
+                  <a:solidFill>
+                    <a:schemeClr val="bg1"/>
+                  </a:solidFill>
+                  <a:latin typeface="Helvetica" panose="020B0604020202020204" pitchFamily="34" charset="0"/>
+                  <a:cs typeface="Helvetica" panose="020B0604020202020204" pitchFamily="34" charset="0"/>
+                </a:rPr>
+                <a:t>1</a:t>
+              </a:r>
+            </a:p>
+          </p:txBody>
+        </p:sp>
+        <p:sp>
+          <p:nvSpPr>
+            <p:cNvPr id="19" name="TextBox 18">
+              <a:extLst>
+                <a:ext uri="{FF2B5EF4-FFF2-40B4-BE49-F238E27FC236}">
+                  <a16:creationId xmlns:a16="http://schemas.microsoft.com/office/drawing/2014/main" id="{458C4FA7-3FB4-41DB-B81E-3596888AEACC}"/>
+                </a:ext>
+              </a:extLst>
+            </p:cNvPr>
+            <p:cNvSpPr txBox="1"/>
+            <p:nvPr/>
+          </p:nvSpPr>
+          <p:spPr>
+            <a:xfrm>
+              <a:off x="4874493" y="4104536"/>
+              <a:ext cx="231227" cy="338554"/>
+            </a:xfrm>
+            <a:prstGeom prst="rect">
+              <a:avLst/>
+            </a:prstGeom>
+            <a:noFill/>
+          </p:spPr>
+          <p:txBody>
+            <a:bodyPr wrap="square" rtlCol="0">
+              <a:spAutoFit/>
+            </a:bodyPr>
+            <a:lstStyle/>
+            <a:p>
+              <a:r>
+                <a:rPr lang="en-US" sz="1600" b="1" dirty="0">
+                  <a:solidFill>
+                    <a:schemeClr val="bg1"/>
+                  </a:solidFill>
+                  <a:latin typeface="Helvetica" panose="020B0604020202020204" pitchFamily="34" charset="0"/>
+                  <a:cs typeface="Helvetica" panose="020B0604020202020204" pitchFamily="34" charset="0"/>
+                </a:rPr>
+                <a:t>1</a:t>
+              </a:r>
+            </a:p>
+          </p:txBody>
+        </p:sp>
+        <p:sp>
+          <p:nvSpPr>
+            <p:cNvPr id="20" name="TextBox 19">
+              <a:extLst>
+                <a:ext uri="{FF2B5EF4-FFF2-40B4-BE49-F238E27FC236}">
+                  <a16:creationId xmlns:a16="http://schemas.microsoft.com/office/drawing/2014/main" id="{D96FF078-38AE-4A98-8A99-88A40A05E94C}"/>
+                </a:ext>
+              </a:extLst>
+            </p:cNvPr>
+            <p:cNvSpPr txBox="1"/>
+            <p:nvPr/>
+          </p:nvSpPr>
+          <p:spPr>
+            <a:xfrm>
+              <a:off x="5168171" y="4104536"/>
+              <a:ext cx="231227" cy="338554"/>
+            </a:xfrm>
+            <a:prstGeom prst="rect">
+              <a:avLst/>
+            </a:prstGeom>
+            <a:noFill/>
+          </p:spPr>
+          <p:txBody>
+            <a:bodyPr wrap="square" rtlCol="0">
+              <a:spAutoFit/>
+            </a:bodyPr>
+            <a:lstStyle/>
+            <a:p>
+              <a:r>
+                <a:rPr lang="en-US" sz="1600" b="1" dirty="0">
+                  <a:solidFill>
+                    <a:schemeClr val="bg1"/>
+                  </a:solidFill>
+                  <a:latin typeface="Helvetica" panose="020B0604020202020204" pitchFamily="34" charset="0"/>
+                  <a:cs typeface="Helvetica" panose="020B0604020202020204" pitchFamily="34" charset="0"/>
+                </a:rPr>
+                <a:t>1</a:t>
+              </a:r>
+            </a:p>
+          </p:txBody>
+        </p:sp>
+        <p:sp>
+          <p:nvSpPr>
+            <p:cNvPr id="21" name="TextBox 20">
+              <a:extLst>
+                <a:ext uri="{FF2B5EF4-FFF2-40B4-BE49-F238E27FC236}">
+                  <a16:creationId xmlns:a16="http://schemas.microsoft.com/office/drawing/2014/main" id="{233E3E4F-420D-4BF1-B88C-525DD3CD5FC4}"/>
+                </a:ext>
+              </a:extLst>
+            </p:cNvPr>
+            <p:cNvSpPr txBox="1"/>
+            <p:nvPr/>
+          </p:nvSpPr>
+          <p:spPr>
+            <a:xfrm>
+              <a:off x="5451339" y="4104536"/>
+              <a:ext cx="231227" cy="338554"/>
+            </a:xfrm>
+            <a:prstGeom prst="rect">
+              <a:avLst/>
+            </a:prstGeom>
+            <a:noFill/>
+          </p:spPr>
+          <p:txBody>
+            <a:bodyPr wrap="square" rtlCol="0">
+              <a:spAutoFit/>
+            </a:bodyPr>
+            <a:lstStyle/>
+            <a:p>
+              <a:r>
+                <a:rPr lang="en-US" sz="1600" b="1" dirty="0">
+                  <a:solidFill>
+                    <a:schemeClr val="bg1"/>
+                  </a:solidFill>
+                  <a:latin typeface="Helvetica" panose="020B0604020202020204" pitchFamily="34" charset="0"/>
+                  <a:cs typeface="Helvetica" panose="020B0604020202020204" pitchFamily="34" charset="0"/>
+                </a:rPr>
+                <a:t>2</a:t>
+              </a:r>
+            </a:p>
+          </p:txBody>
+        </p:sp>
+        <p:sp>
+          <p:nvSpPr>
+            <p:cNvPr id="22" name="TextBox 21">
+              <a:extLst>
+                <a:ext uri="{FF2B5EF4-FFF2-40B4-BE49-F238E27FC236}">
+                  <a16:creationId xmlns:a16="http://schemas.microsoft.com/office/drawing/2014/main" id="{F9AD7CEF-0E1A-40BE-AFC6-A6A72B548DC7}"/>
+                </a:ext>
+              </a:extLst>
+            </p:cNvPr>
+            <p:cNvSpPr txBox="1"/>
+            <p:nvPr/>
+          </p:nvSpPr>
+          <p:spPr>
+            <a:xfrm>
+              <a:off x="5734507" y="4104536"/>
+              <a:ext cx="231227" cy="338554"/>
+            </a:xfrm>
+            <a:prstGeom prst="rect">
+              <a:avLst/>
+            </a:prstGeom>
+            <a:noFill/>
+          </p:spPr>
+          <p:txBody>
+            <a:bodyPr wrap="square" rtlCol="0">
+              <a:spAutoFit/>
+            </a:bodyPr>
+            <a:lstStyle/>
+            <a:p>
+              <a:r>
+                <a:rPr lang="en-US" sz="1600" b="1" dirty="0">
+                  <a:solidFill>
+                    <a:schemeClr val="bg1"/>
+                  </a:solidFill>
+                  <a:latin typeface="Helvetica" panose="020B0604020202020204" pitchFamily="34" charset="0"/>
+                  <a:cs typeface="Helvetica" panose="020B0604020202020204" pitchFamily="34" charset="0"/>
+                </a:rPr>
+                <a:t>1</a:t>
+              </a:r>
+            </a:p>
+          </p:txBody>
+        </p:sp>
+        <p:sp>
+          <p:nvSpPr>
+            <p:cNvPr id="23" name="TextBox 22">
+              <a:extLst>
+                <a:ext uri="{FF2B5EF4-FFF2-40B4-BE49-F238E27FC236}">
+                  <a16:creationId xmlns:a16="http://schemas.microsoft.com/office/drawing/2014/main" id="{D9249A97-52ED-4616-BFE5-386C3F73AC44}"/>
+                </a:ext>
+              </a:extLst>
+            </p:cNvPr>
+            <p:cNvSpPr txBox="1"/>
+            <p:nvPr/>
+          </p:nvSpPr>
+          <p:spPr>
+            <a:xfrm>
+              <a:off x="6017672" y="4104536"/>
+              <a:ext cx="231227" cy="338554"/>
+            </a:xfrm>
+            <a:prstGeom prst="rect">
+              <a:avLst/>
+            </a:prstGeom>
+            <a:noFill/>
+          </p:spPr>
+          <p:txBody>
+            <a:bodyPr wrap="square" rtlCol="0">
+              <a:spAutoFit/>
+            </a:bodyPr>
+            <a:lstStyle/>
+            <a:p>
+              <a:r>
+                <a:rPr lang="en-US" sz="1600" b="1" dirty="0">
+                  <a:solidFill>
+                    <a:schemeClr val="bg1"/>
+                  </a:solidFill>
+                  <a:latin typeface="Helvetica" panose="020B0604020202020204" pitchFamily="34" charset="0"/>
+                  <a:cs typeface="Helvetica" panose="020B0604020202020204" pitchFamily="34" charset="0"/>
+                </a:rPr>
+                <a:t>1</a:t>
+              </a:r>
+            </a:p>
+          </p:txBody>
+        </p:sp>
+        <p:sp>
+          <p:nvSpPr>
+            <p:cNvPr id="24" name="TextBox 23">
+              <a:extLst>
+                <a:ext uri="{FF2B5EF4-FFF2-40B4-BE49-F238E27FC236}">
+                  <a16:creationId xmlns:a16="http://schemas.microsoft.com/office/drawing/2014/main" id="{33CA0C7A-F70B-4983-A55C-7B69F6A418BC}"/>
+                </a:ext>
+              </a:extLst>
+            </p:cNvPr>
+            <p:cNvSpPr txBox="1"/>
+            <p:nvPr/>
+          </p:nvSpPr>
+          <p:spPr>
+            <a:xfrm>
+              <a:off x="11440512" y="4104536"/>
+              <a:ext cx="231227" cy="338554"/>
+            </a:xfrm>
+            <a:prstGeom prst="rect">
+              <a:avLst/>
+            </a:prstGeom>
+            <a:noFill/>
+          </p:spPr>
+          <p:txBody>
+            <a:bodyPr wrap="square" rtlCol="0">
+              <a:spAutoFit/>
+            </a:bodyPr>
+            <a:lstStyle/>
+            <a:p>
+              <a:r>
+                <a:rPr lang="en-US" sz="1600" b="1" dirty="0">
+                  <a:solidFill>
+                    <a:schemeClr val="bg1"/>
+                  </a:solidFill>
+                  <a:latin typeface="Helvetica" panose="020B0604020202020204" pitchFamily="34" charset="0"/>
+                  <a:cs typeface="Helvetica" panose="020B0604020202020204" pitchFamily="34" charset="0"/>
+                </a:rPr>
+                <a:t>1</a:t>
+              </a:r>
+            </a:p>
+          </p:txBody>
+        </p:sp>
+        <p:sp>
+          <p:nvSpPr>
+            <p:cNvPr id="25" name="TextBox 24">
+              <a:extLst>
+                <a:ext uri="{FF2B5EF4-FFF2-40B4-BE49-F238E27FC236}">
+                  <a16:creationId xmlns:a16="http://schemas.microsoft.com/office/drawing/2014/main" id="{A3F7F08E-C175-4602-A47E-6BB80275F88D}"/>
+                </a:ext>
+              </a:extLst>
+            </p:cNvPr>
+            <p:cNvSpPr txBox="1"/>
+            <p:nvPr/>
+          </p:nvSpPr>
+          <p:spPr>
+            <a:xfrm>
+              <a:off x="9972119" y="4104536"/>
+              <a:ext cx="231227" cy="338554"/>
+            </a:xfrm>
+            <a:prstGeom prst="rect">
+              <a:avLst/>
+            </a:prstGeom>
+            <a:noFill/>
+          </p:spPr>
+          <p:txBody>
+            <a:bodyPr wrap="square" rtlCol="0">
+              <a:spAutoFit/>
+            </a:bodyPr>
+            <a:lstStyle/>
+            <a:p>
+              <a:r>
+                <a:rPr lang="en-US" sz="1600" b="1" dirty="0">
+                  <a:solidFill>
+                    <a:schemeClr val="bg1"/>
+                  </a:solidFill>
+                  <a:latin typeface="Helvetica" panose="020B0604020202020204" pitchFamily="34" charset="0"/>
+                  <a:cs typeface="Helvetica" panose="020B0604020202020204" pitchFamily="34" charset="0"/>
+                </a:rPr>
+                <a:t>1</a:t>
+              </a:r>
+            </a:p>
+          </p:txBody>
+        </p:sp>
+        <p:sp>
+          <p:nvSpPr>
+            <p:cNvPr id="26" name="TextBox 25">
+              <a:extLst>
+                <a:ext uri="{FF2B5EF4-FFF2-40B4-BE49-F238E27FC236}">
+                  <a16:creationId xmlns:a16="http://schemas.microsoft.com/office/drawing/2014/main" id="{5D29BDC7-D41C-48FD-BEEC-E1E5A745E18B}"/>
+                </a:ext>
+              </a:extLst>
+            </p:cNvPr>
+            <p:cNvSpPr txBox="1"/>
+            <p:nvPr/>
+          </p:nvSpPr>
+          <p:spPr>
+            <a:xfrm>
+              <a:off x="10265797" y="4104536"/>
+              <a:ext cx="231227" cy="338554"/>
+            </a:xfrm>
+            <a:prstGeom prst="rect">
+              <a:avLst/>
+            </a:prstGeom>
+            <a:noFill/>
+          </p:spPr>
+          <p:txBody>
+            <a:bodyPr wrap="square" rtlCol="0">
+              <a:spAutoFit/>
+            </a:bodyPr>
+            <a:lstStyle/>
+            <a:p>
+              <a:r>
+                <a:rPr lang="en-US" sz="1600" b="1" dirty="0">
+                  <a:solidFill>
+                    <a:schemeClr val="bg1"/>
+                  </a:solidFill>
+                  <a:latin typeface="Helvetica" panose="020B0604020202020204" pitchFamily="34" charset="0"/>
+                  <a:cs typeface="Helvetica" panose="020B0604020202020204" pitchFamily="34" charset="0"/>
+                </a:rPr>
+                <a:t>1</a:t>
+              </a:r>
+            </a:p>
+          </p:txBody>
+        </p:sp>
+        <p:sp>
+          <p:nvSpPr>
+            <p:cNvPr id="27" name="TextBox 26">
+              <a:extLst>
+                <a:ext uri="{FF2B5EF4-FFF2-40B4-BE49-F238E27FC236}">
+                  <a16:creationId xmlns:a16="http://schemas.microsoft.com/office/drawing/2014/main" id="{ED224FEB-C5E3-4107-9323-D188DEDD2088}"/>
+                </a:ext>
+              </a:extLst>
+            </p:cNvPr>
+            <p:cNvSpPr txBox="1"/>
+            <p:nvPr/>
+          </p:nvSpPr>
+          <p:spPr>
+            <a:xfrm>
+              <a:off x="10559475" y="4104536"/>
+              <a:ext cx="231227" cy="338554"/>
+            </a:xfrm>
+            <a:prstGeom prst="rect">
+              <a:avLst/>
+            </a:prstGeom>
+            <a:noFill/>
+          </p:spPr>
+          <p:txBody>
+            <a:bodyPr wrap="square" rtlCol="0">
+              <a:spAutoFit/>
+            </a:bodyPr>
+            <a:lstStyle/>
+            <a:p>
+              <a:r>
+                <a:rPr lang="en-US" sz="1600" b="1" dirty="0">
+                  <a:solidFill>
+                    <a:schemeClr val="bg1"/>
+                  </a:solidFill>
+                  <a:latin typeface="Helvetica" panose="020B0604020202020204" pitchFamily="34" charset="0"/>
+                  <a:cs typeface="Helvetica" panose="020B0604020202020204" pitchFamily="34" charset="0"/>
+                </a:rPr>
+                <a:t>3</a:t>
+              </a:r>
+            </a:p>
+          </p:txBody>
+        </p:sp>
+        <p:sp>
+          <p:nvSpPr>
+            <p:cNvPr id="28" name="TextBox 27">
+              <a:extLst>
+                <a:ext uri="{FF2B5EF4-FFF2-40B4-BE49-F238E27FC236}">
+                  <a16:creationId xmlns:a16="http://schemas.microsoft.com/office/drawing/2014/main" id="{EF0E02AA-3C03-4918-8A63-2DD751A3D1A1}"/>
+                </a:ext>
+              </a:extLst>
+            </p:cNvPr>
+            <p:cNvSpPr txBox="1"/>
+            <p:nvPr/>
+          </p:nvSpPr>
+          <p:spPr>
+            <a:xfrm>
+              <a:off x="10853153" y="4104536"/>
+              <a:ext cx="231227" cy="338554"/>
+            </a:xfrm>
+            <a:prstGeom prst="rect">
+              <a:avLst/>
+            </a:prstGeom>
+            <a:noFill/>
+          </p:spPr>
+          <p:txBody>
+            <a:bodyPr wrap="square" rtlCol="0">
+              <a:spAutoFit/>
+            </a:bodyPr>
+            <a:lstStyle/>
+            <a:p>
+              <a:r>
+                <a:rPr lang="en-US" sz="1600" b="1" dirty="0">
+                  <a:solidFill>
+                    <a:schemeClr val="bg1"/>
+                  </a:solidFill>
+                  <a:latin typeface="Helvetica" panose="020B0604020202020204" pitchFamily="34" charset="0"/>
+                  <a:cs typeface="Helvetica" panose="020B0604020202020204" pitchFamily="34" charset="0"/>
+                </a:rPr>
+                <a:t>8</a:t>
+              </a:r>
+            </a:p>
+          </p:txBody>
+        </p:sp>
+        <p:sp>
+          <p:nvSpPr>
+            <p:cNvPr id="29" name="TextBox 28">
+              <a:extLst>
+                <a:ext uri="{FF2B5EF4-FFF2-40B4-BE49-F238E27FC236}">
+                  <a16:creationId xmlns:a16="http://schemas.microsoft.com/office/drawing/2014/main" id="{27FE264A-991E-4854-A579-EF197F874752}"/>
+                </a:ext>
+              </a:extLst>
+            </p:cNvPr>
+            <p:cNvSpPr txBox="1"/>
+            <p:nvPr/>
+          </p:nvSpPr>
+          <p:spPr>
+            <a:xfrm>
+              <a:off x="11146831" y="4104536"/>
+              <a:ext cx="231227" cy="338554"/>
+            </a:xfrm>
+            <a:prstGeom prst="rect">
+              <a:avLst/>
+            </a:prstGeom>
+            <a:noFill/>
+          </p:spPr>
+          <p:txBody>
+            <a:bodyPr wrap="square" rtlCol="0">
+              <a:spAutoFit/>
+            </a:bodyPr>
+            <a:lstStyle/>
+            <a:p>
+              <a:r>
+                <a:rPr lang="en-US" sz="1600" b="1" dirty="0">
+                  <a:solidFill>
+                    <a:schemeClr val="bg1"/>
+                  </a:solidFill>
+                  <a:latin typeface="Helvetica" panose="020B0604020202020204" pitchFamily="34" charset="0"/>
+                  <a:cs typeface="Helvetica" panose="020B0604020202020204" pitchFamily="34" charset="0"/>
+                </a:rPr>
+                <a:t>1</a:t>
+              </a:r>
+            </a:p>
+          </p:txBody>
+        </p:sp>
+        <p:sp>
+          <p:nvSpPr>
+            <p:cNvPr id="30" name="TextBox 29">
+              <a:extLst>
+                <a:ext uri="{FF2B5EF4-FFF2-40B4-BE49-F238E27FC236}">
+                  <a16:creationId xmlns:a16="http://schemas.microsoft.com/office/drawing/2014/main" id="{7FE8A4C7-277E-4963-8122-EED98C571975}"/>
+                </a:ext>
+              </a:extLst>
+            </p:cNvPr>
+            <p:cNvSpPr txBox="1"/>
+            <p:nvPr/>
+          </p:nvSpPr>
+          <p:spPr>
+            <a:xfrm>
+              <a:off x="8157501" y="4104536"/>
+              <a:ext cx="231227" cy="338554"/>
+            </a:xfrm>
+            <a:prstGeom prst="rect">
+              <a:avLst/>
+            </a:prstGeom>
+            <a:noFill/>
+          </p:spPr>
+          <p:txBody>
+            <a:bodyPr wrap="square" rtlCol="0">
+              <a:spAutoFit/>
+            </a:bodyPr>
+            <a:lstStyle/>
+            <a:p>
+              <a:r>
+                <a:rPr lang="en-US" sz="1600" b="1" dirty="0">
+                  <a:solidFill>
+                    <a:schemeClr val="bg1"/>
+                  </a:solidFill>
+                  <a:latin typeface="Helvetica" panose="020B0604020202020204" pitchFamily="34" charset="0"/>
+                  <a:cs typeface="Helvetica" panose="020B0604020202020204" pitchFamily="34" charset="0"/>
+                </a:rPr>
+                <a:t>1</a:t>
+              </a:r>
+            </a:p>
+          </p:txBody>
+        </p:sp>
+        <p:sp>
+          <p:nvSpPr>
+            <p:cNvPr id="31" name="TextBox 30">
+              <a:extLst>
+                <a:ext uri="{FF2B5EF4-FFF2-40B4-BE49-F238E27FC236}">
+                  <a16:creationId xmlns:a16="http://schemas.microsoft.com/office/drawing/2014/main" id="{4BEFBBBD-B01C-442E-BB1D-883E64223D78}"/>
+                </a:ext>
+              </a:extLst>
+            </p:cNvPr>
+            <p:cNvSpPr txBox="1"/>
+            <p:nvPr/>
+          </p:nvSpPr>
+          <p:spPr>
+            <a:xfrm>
+              <a:off x="8430159" y="4104536"/>
+              <a:ext cx="231227" cy="338554"/>
+            </a:xfrm>
+            <a:prstGeom prst="rect">
+              <a:avLst/>
+            </a:prstGeom>
+            <a:noFill/>
+          </p:spPr>
+          <p:txBody>
+            <a:bodyPr wrap="square" rtlCol="0">
+              <a:spAutoFit/>
+            </a:bodyPr>
+            <a:lstStyle/>
+            <a:p>
+              <a:r>
+                <a:rPr lang="en-US" sz="1600" b="1" dirty="0">
+                  <a:solidFill>
+                    <a:schemeClr val="bg1"/>
+                  </a:solidFill>
+                  <a:latin typeface="Helvetica" panose="020B0604020202020204" pitchFamily="34" charset="0"/>
+                  <a:cs typeface="Helvetica" panose="020B0604020202020204" pitchFamily="34" charset="0"/>
+                </a:rPr>
+                <a:t>1</a:t>
+              </a:r>
+            </a:p>
+          </p:txBody>
+        </p:sp>
+        <p:sp>
+          <p:nvSpPr>
+            <p:cNvPr id="32" name="TextBox 31">
+              <a:extLst>
+                <a:ext uri="{FF2B5EF4-FFF2-40B4-BE49-F238E27FC236}">
+                  <a16:creationId xmlns:a16="http://schemas.microsoft.com/office/drawing/2014/main" id="{F1E14879-CCFE-4992-8ACF-0C07E5068A27}"/>
+                </a:ext>
+              </a:extLst>
+            </p:cNvPr>
+            <p:cNvSpPr txBox="1"/>
+            <p:nvPr/>
+          </p:nvSpPr>
+          <p:spPr>
+            <a:xfrm>
+              <a:off x="8702817" y="4104536"/>
+              <a:ext cx="231227" cy="338554"/>
+            </a:xfrm>
+            <a:prstGeom prst="rect">
+              <a:avLst/>
+            </a:prstGeom>
+            <a:noFill/>
+          </p:spPr>
+          <p:txBody>
+            <a:bodyPr wrap="square" rtlCol="0">
+              <a:spAutoFit/>
+            </a:bodyPr>
+            <a:lstStyle/>
+            <a:p>
+              <a:r>
+                <a:rPr lang="en-US" sz="1600" b="1" dirty="0">
+                  <a:solidFill>
+                    <a:schemeClr val="bg1"/>
+                  </a:solidFill>
+                  <a:latin typeface="Helvetica" panose="020B0604020202020204" pitchFamily="34" charset="0"/>
+                  <a:cs typeface="Helvetica" panose="020B0604020202020204" pitchFamily="34" charset="0"/>
+                </a:rPr>
+                <a:t>1</a:t>
+              </a:r>
+            </a:p>
+          </p:txBody>
+        </p:sp>
+        <p:sp>
+          <p:nvSpPr>
+            <p:cNvPr id="33" name="TextBox 32">
+              <a:extLst>
+                <a:ext uri="{FF2B5EF4-FFF2-40B4-BE49-F238E27FC236}">
+                  <a16:creationId xmlns:a16="http://schemas.microsoft.com/office/drawing/2014/main" id="{5FBFD220-4464-428B-BD62-026C19D7964B}"/>
+                </a:ext>
+              </a:extLst>
+            </p:cNvPr>
+            <p:cNvSpPr txBox="1"/>
+            <p:nvPr/>
+          </p:nvSpPr>
+          <p:spPr>
+            <a:xfrm>
+              <a:off x="8985985" y="4104536"/>
+              <a:ext cx="231227" cy="338554"/>
+            </a:xfrm>
+            <a:prstGeom prst="rect">
+              <a:avLst/>
+            </a:prstGeom>
+            <a:noFill/>
+          </p:spPr>
+          <p:txBody>
+            <a:bodyPr wrap="square" rtlCol="0">
+              <a:spAutoFit/>
+            </a:bodyPr>
+            <a:lstStyle/>
+            <a:p>
+              <a:r>
+                <a:rPr lang="en-US" sz="1600" b="1" dirty="0">
+                  <a:solidFill>
+                    <a:schemeClr val="bg1"/>
+                  </a:solidFill>
+                  <a:latin typeface="Helvetica" panose="020B0604020202020204" pitchFamily="34" charset="0"/>
+                  <a:cs typeface="Helvetica" panose="020B0604020202020204" pitchFamily="34" charset="0"/>
+                </a:rPr>
+                <a:t>1</a:t>
+              </a:r>
+            </a:p>
+          </p:txBody>
+        </p:sp>
+        <p:sp>
+          <p:nvSpPr>
+            <p:cNvPr id="34" name="TextBox 33">
+              <a:extLst>
+                <a:ext uri="{FF2B5EF4-FFF2-40B4-BE49-F238E27FC236}">
+                  <a16:creationId xmlns:a16="http://schemas.microsoft.com/office/drawing/2014/main" id="{1598BC3F-AEF2-4205-9028-37E5E1F94761}"/>
+                </a:ext>
+              </a:extLst>
+            </p:cNvPr>
+            <p:cNvSpPr txBox="1"/>
+            <p:nvPr/>
+          </p:nvSpPr>
+          <p:spPr>
+            <a:xfrm>
+              <a:off x="9279663" y="4104536"/>
+              <a:ext cx="231227" cy="338554"/>
+            </a:xfrm>
+            <a:prstGeom prst="rect">
+              <a:avLst/>
+            </a:prstGeom>
+            <a:noFill/>
+          </p:spPr>
+          <p:txBody>
+            <a:bodyPr wrap="square" rtlCol="0">
+              <a:spAutoFit/>
+            </a:bodyPr>
+            <a:lstStyle/>
+            <a:p>
+              <a:r>
+                <a:rPr lang="en-US" sz="1600" b="1" dirty="0">
+                  <a:solidFill>
+                    <a:schemeClr val="bg1"/>
+                  </a:solidFill>
+                  <a:latin typeface="Helvetica" panose="020B0604020202020204" pitchFamily="34" charset="0"/>
+                  <a:cs typeface="Helvetica" panose="020B0604020202020204" pitchFamily="34" charset="0"/>
+                </a:rPr>
+                <a:t>1</a:t>
+              </a:r>
+            </a:p>
+          </p:txBody>
+        </p:sp>
+        <p:sp>
+          <p:nvSpPr>
+            <p:cNvPr id="35" name="TextBox 34">
+              <a:extLst>
+                <a:ext uri="{FF2B5EF4-FFF2-40B4-BE49-F238E27FC236}">
+                  <a16:creationId xmlns:a16="http://schemas.microsoft.com/office/drawing/2014/main" id="{5F7AF1E3-E9D1-4E32-B24D-2065B3C3A3F4}"/>
+                </a:ext>
+              </a:extLst>
+            </p:cNvPr>
+            <p:cNvSpPr txBox="1"/>
+            <p:nvPr/>
+          </p:nvSpPr>
+          <p:spPr>
+            <a:xfrm>
+              <a:off x="9583850" y="4104536"/>
+              <a:ext cx="231227" cy="338554"/>
+            </a:xfrm>
+            <a:prstGeom prst="rect">
+              <a:avLst/>
+            </a:prstGeom>
+            <a:noFill/>
+          </p:spPr>
+          <p:txBody>
+            <a:bodyPr wrap="square" rtlCol="0">
+              <a:spAutoFit/>
+            </a:bodyPr>
+            <a:lstStyle/>
+            <a:p>
+              <a:r>
+                <a:rPr lang="en-US" sz="1600" b="1" dirty="0">
+                  <a:solidFill>
+                    <a:schemeClr val="bg1"/>
+                  </a:solidFill>
+                  <a:latin typeface="Helvetica" panose="020B0604020202020204" pitchFamily="34" charset="0"/>
+                  <a:cs typeface="Helvetica" panose="020B0604020202020204" pitchFamily="34" charset="0"/>
+                </a:rPr>
+                <a:t>1</a:t>
+              </a:r>
+            </a:p>
+          </p:txBody>
+        </p:sp>
+        <p:sp>
+          <p:nvSpPr>
+            <p:cNvPr id="36" name="TextBox 35">
+              <a:extLst>
+                <a:ext uri="{FF2B5EF4-FFF2-40B4-BE49-F238E27FC236}">
+                  <a16:creationId xmlns:a16="http://schemas.microsoft.com/office/drawing/2014/main" id="{294F19E7-B827-4567-B8BF-7AE93DC03E84}"/>
+                </a:ext>
+              </a:extLst>
+            </p:cNvPr>
+            <p:cNvSpPr txBox="1"/>
+            <p:nvPr/>
+          </p:nvSpPr>
+          <p:spPr>
+            <a:xfrm>
+              <a:off x="6584006" y="4104536"/>
+              <a:ext cx="231227" cy="338554"/>
+            </a:xfrm>
+            <a:prstGeom prst="rect">
+              <a:avLst/>
+            </a:prstGeom>
+            <a:noFill/>
+          </p:spPr>
+          <p:txBody>
+            <a:bodyPr wrap="square" rtlCol="0">
+              <a:spAutoFit/>
+            </a:bodyPr>
+            <a:lstStyle/>
+            <a:p>
+              <a:r>
+                <a:rPr lang="en-US" sz="1600" b="1" dirty="0">
+                  <a:solidFill>
+                    <a:schemeClr val="bg1"/>
+                  </a:solidFill>
+                  <a:latin typeface="Helvetica" panose="020B0604020202020204" pitchFamily="34" charset="0"/>
+                  <a:cs typeface="Helvetica" panose="020B0604020202020204" pitchFamily="34" charset="0"/>
+                </a:rPr>
+                <a:t>1</a:t>
+              </a:r>
+            </a:p>
+          </p:txBody>
+        </p:sp>
+        <p:sp>
+          <p:nvSpPr>
+            <p:cNvPr id="37" name="TextBox 36">
+              <a:extLst>
+                <a:ext uri="{FF2B5EF4-FFF2-40B4-BE49-F238E27FC236}">
+                  <a16:creationId xmlns:a16="http://schemas.microsoft.com/office/drawing/2014/main" id="{75ED76EB-592C-4AC9-867F-766E1200BF4D}"/>
+                </a:ext>
+              </a:extLst>
+            </p:cNvPr>
+            <p:cNvSpPr txBox="1"/>
+            <p:nvPr/>
+          </p:nvSpPr>
+          <p:spPr>
+            <a:xfrm>
+              <a:off x="6993299" y="4104536"/>
+              <a:ext cx="231227" cy="338554"/>
+            </a:xfrm>
+            <a:prstGeom prst="rect">
+              <a:avLst/>
+            </a:prstGeom>
+            <a:noFill/>
+          </p:spPr>
+          <p:txBody>
+            <a:bodyPr wrap="square" rtlCol="0">
+              <a:spAutoFit/>
+            </a:bodyPr>
+            <a:lstStyle/>
+            <a:p>
+              <a:r>
+                <a:rPr lang="en-US" sz="1600" b="1" dirty="0">
+                  <a:solidFill>
+                    <a:schemeClr val="bg1"/>
+                  </a:solidFill>
+                  <a:latin typeface="Helvetica" panose="020B0604020202020204" pitchFamily="34" charset="0"/>
+                  <a:cs typeface="Helvetica" panose="020B0604020202020204" pitchFamily="34" charset="0"/>
+                </a:rPr>
+                <a:t>5</a:t>
+              </a:r>
+            </a:p>
+          </p:txBody>
+        </p:sp>
+        <p:sp>
+          <p:nvSpPr>
+            <p:cNvPr id="38" name="TextBox 37">
+              <a:extLst>
+                <a:ext uri="{FF2B5EF4-FFF2-40B4-BE49-F238E27FC236}">
+                  <a16:creationId xmlns:a16="http://schemas.microsoft.com/office/drawing/2014/main" id="{482ABF42-7A1D-4905-AEA1-BADA4DABFB99}"/>
+                </a:ext>
+              </a:extLst>
+            </p:cNvPr>
+            <p:cNvSpPr txBox="1"/>
+            <p:nvPr/>
+          </p:nvSpPr>
+          <p:spPr>
+            <a:xfrm>
+              <a:off x="7863823" y="4104536"/>
+              <a:ext cx="231227" cy="338554"/>
+            </a:xfrm>
+            <a:prstGeom prst="rect">
+              <a:avLst/>
+            </a:prstGeom>
+            <a:noFill/>
+          </p:spPr>
+          <p:txBody>
+            <a:bodyPr wrap="square" rtlCol="0">
+              <a:spAutoFit/>
+            </a:bodyPr>
+            <a:lstStyle/>
+            <a:p>
+              <a:r>
+                <a:rPr lang="en-US" sz="1600" b="1" dirty="0">
+                  <a:solidFill>
+                    <a:schemeClr val="bg1"/>
+                  </a:solidFill>
+                  <a:latin typeface="Helvetica" panose="020B0604020202020204" pitchFamily="34" charset="0"/>
+                  <a:cs typeface="Helvetica" panose="020B0604020202020204" pitchFamily="34" charset="0"/>
+                </a:rPr>
+                <a:t>1</a:t>
+              </a:r>
+            </a:p>
+          </p:txBody>
+        </p:sp>
+        <p:sp>
+          <p:nvSpPr>
+            <p:cNvPr id="39" name="TextBox 38">
+              <a:extLst>
+                <a:ext uri="{FF2B5EF4-FFF2-40B4-BE49-F238E27FC236}">
+                  <a16:creationId xmlns:a16="http://schemas.microsoft.com/office/drawing/2014/main" id="{F8A70C18-A38D-4739-BA51-41322A29AB8F}"/>
+                </a:ext>
+              </a:extLst>
+            </p:cNvPr>
+            <p:cNvSpPr txBox="1"/>
+            <p:nvPr/>
+          </p:nvSpPr>
+          <p:spPr>
+            <a:xfrm>
+              <a:off x="7276467" y="4104536"/>
+              <a:ext cx="231227" cy="338554"/>
+            </a:xfrm>
+            <a:prstGeom prst="rect">
+              <a:avLst/>
+            </a:prstGeom>
+            <a:noFill/>
+          </p:spPr>
+          <p:txBody>
+            <a:bodyPr wrap="square" rtlCol="0">
+              <a:spAutoFit/>
+            </a:bodyPr>
+            <a:lstStyle/>
+            <a:p>
+              <a:r>
+                <a:rPr lang="en-US" sz="1600" b="1" dirty="0">
+                  <a:solidFill>
+                    <a:schemeClr val="bg1"/>
+                  </a:solidFill>
+                  <a:latin typeface="Helvetica" panose="020B0604020202020204" pitchFamily="34" charset="0"/>
+                  <a:cs typeface="Helvetica" panose="020B0604020202020204" pitchFamily="34" charset="0"/>
+                </a:rPr>
+                <a:t>1</a:t>
+              </a:r>
+            </a:p>
+          </p:txBody>
+        </p:sp>
+        <p:sp>
+          <p:nvSpPr>
+            <p:cNvPr id="40" name="TextBox 39">
+              <a:extLst>
+                <a:ext uri="{FF2B5EF4-FFF2-40B4-BE49-F238E27FC236}">
+                  <a16:creationId xmlns:a16="http://schemas.microsoft.com/office/drawing/2014/main" id="{96E0FE06-F08B-4A80-BB02-B43F6B1E1183}"/>
+                </a:ext>
+              </a:extLst>
+            </p:cNvPr>
+            <p:cNvSpPr txBox="1"/>
+            <p:nvPr/>
+          </p:nvSpPr>
+          <p:spPr>
+            <a:xfrm>
+              <a:off x="7580655" y="4104536"/>
+              <a:ext cx="231227" cy="338554"/>
+            </a:xfrm>
+            <a:prstGeom prst="rect">
+              <a:avLst/>
+            </a:prstGeom>
+            <a:noFill/>
+          </p:spPr>
+          <p:txBody>
+            <a:bodyPr wrap="square" rtlCol="0">
+              <a:spAutoFit/>
+            </a:bodyPr>
+            <a:lstStyle/>
+            <a:p>
+              <a:r>
+                <a:rPr lang="en-US" sz="1600" b="1" dirty="0">
+                  <a:solidFill>
+                    <a:schemeClr val="bg1"/>
+                  </a:solidFill>
+                  <a:latin typeface="Helvetica" panose="020B0604020202020204" pitchFamily="34" charset="0"/>
+                  <a:cs typeface="Helvetica" panose="020B0604020202020204" pitchFamily="34" charset="0"/>
+                </a:rPr>
+                <a:t>1</a:t>
+              </a:r>
+            </a:p>
+          </p:txBody>
+        </p:sp>
+        <p:sp>
+          <p:nvSpPr>
+            <p:cNvPr id="41" name="TextBox 40">
+              <a:extLst>
+                <a:ext uri="{FF2B5EF4-FFF2-40B4-BE49-F238E27FC236}">
+                  <a16:creationId xmlns:a16="http://schemas.microsoft.com/office/drawing/2014/main" id="{0696B10D-0520-4E2C-AFBC-BC0659BBBBCF}"/>
+                </a:ext>
+              </a:extLst>
+            </p:cNvPr>
+            <p:cNvSpPr txBox="1"/>
+            <p:nvPr/>
+          </p:nvSpPr>
+          <p:spPr>
+            <a:xfrm>
+              <a:off x="6290329" y="4104536"/>
+              <a:ext cx="231227" cy="338554"/>
+            </a:xfrm>
+            <a:prstGeom prst="rect">
+              <a:avLst/>
+            </a:prstGeom>
+            <a:noFill/>
+          </p:spPr>
+          <p:txBody>
+            <a:bodyPr wrap="square" rtlCol="0">
+              <a:spAutoFit/>
+            </a:bodyPr>
+            <a:lstStyle/>
+            <a:p>
+              <a:r>
+                <a:rPr lang="en-US" sz="1600" b="1" dirty="0">
+                  <a:solidFill>
+                    <a:schemeClr val="bg1"/>
+                  </a:solidFill>
+                  <a:latin typeface="Helvetica" panose="020B0604020202020204" pitchFamily="34" charset="0"/>
+                  <a:cs typeface="Helvetica" panose="020B0604020202020204" pitchFamily="34" charset="0"/>
+                </a:rPr>
+                <a:t>1</a:t>
+              </a:r>
+            </a:p>
+          </p:txBody>
+        </p:sp>
+      </p:grpSp>
+    </p:spTree>
+    <p:extLst>
+      <p:ext uri="{BB962C8B-B14F-4D97-AF65-F5344CB8AC3E}">
+        <p14:creationId xmlns:p14="http://schemas.microsoft.com/office/powerpoint/2010/main" val="2903906713"/>
+      </p:ext>
+    </p:extLst>
+  </p:cSld>
+  <p:clrMapOvr>
+    <a:masterClrMapping/>
+  </p:clrMapOvr>
+</p:sld>
+</file>
+
+<file path=ppt/slides/slide3.xml><?xml version="1.0" encoding="utf-8"?>
+<p:sld xmlns:a="http://schemas.openxmlformats.org/drawingml/2006/main" xmlns:r="http://schemas.openxmlformats.org/officeDocument/2006/relationships" xmlns:p="http://schemas.openxmlformats.org/presentationml/2006/main">
+  <p:cSld>
+    <p:spTree>
+      <p:nvGrpSpPr>
+        <p:cNvPr id="1" name=""/>
+        <p:cNvGrpSpPr/>
+        <p:nvPr/>
+      </p:nvGrpSpPr>
+      <p:grpSpPr>
+        <a:xfrm>
+          <a:off x="0" y="0"/>
+          <a:ext cx="0" cy="0"/>
+          <a:chOff x="0" y="0"/>
+          <a:chExt cx="0" cy="0"/>
+        </a:xfrm>
+      </p:grpSpPr>
+      <p:grpSp>
+        <p:nvGrpSpPr>
+          <p:cNvPr id="4" name="Group 3">
+            <a:extLst>
+              <a:ext uri="{FF2B5EF4-FFF2-40B4-BE49-F238E27FC236}">
+                <a16:creationId xmlns:a16="http://schemas.microsoft.com/office/drawing/2014/main" id="{356FE12E-6790-4E21-A4DC-FE722823A5C4}"/>
+              </a:ext>
+            </a:extLst>
+          </p:cNvPr>
+          <p:cNvGrpSpPr/>
+          <p:nvPr/>
+        </p:nvGrpSpPr>
+        <p:grpSpPr>
+          <a:xfrm>
+            <a:off x="607262" y="1790436"/>
+            <a:ext cx="11290341" cy="3277127"/>
+            <a:chOff x="607262" y="1790436"/>
+            <a:chExt cx="11290341" cy="3277127"/>
+          </a:xfrm>
+        </p:grpSpPr>
+        <p:pic>
+          <p:nvPicPr>
+            <p:cNvPr id="5" name="Picture 4" descr="Chart, histogram&#10;&#10;Description automatically generated">
+              <a:extLst>
+                <a:ext uri="{FF2B5EF4-FFF2-40B4-BE49-F238E27FC236}">
+                  <a16:creationId xmlns:a16="http://schemas.microsoft.com/office/drawing/2014/main" id="{E20F3874-F1A9-467E-AA39-E6420A7E34D7}"/>
+                </a:ext>
+              </a:extLst>
+            </p:cNvPr>
+            <p:cNvPicPr>
+              <a:picLocks noChangeAspect="1"/>
+            </p:cNvPicPr>
+            <p:nvPr/>
+          </p:nvPicPr>
+          <p:blipFill rotWithShape="1">
+            <a:blip r:embed="rId2">
+              <a:extLst>
+                <a:ext uri="{28A0092B-C50C-407E-A947-70E740481C1C}">
+                  <a14:useLocalDpi xmlns:a14="http://schemas.microsoft.com/office/drawing/2010/main" val="0"/>
+                </a:ext>
+              </a:extLst>
+            </a:blip>
+            <a:srcRect t="12873"/>
+            <a:stretch/>
+          </p:blipFill>
+          <p:spPr>
+            <a:xfrm>
+              <a:off x="607262" y="1790436"/>
+              <a:ext cx="11290341" cy="3277127"/>
+            </a:xfrm>
+            <a:prstGeom prst="rect">
+              <a:avLst/>
+            </a:prstGeom>
+          </p:spPr>
+        </p:pic>
+        <p:sp>
+          <p:nvSpPr>
+            <p:cNvPr id="6" name="TextBox 5">
+              <a:extLst>
+                <a:ext uri="{FF2B5EF4-FFF2-40B4-BE49-F238E27FC236}">
+                  <a16:creationId xmlns:a16="http://schemas.microsoft.com/office/drawing/2014/main" id="{F8292390-1C8F-4936-A190-1F9A70FC451C}"/>
+                </a:ext>
+              </a:extLst>
+            </p:cNvPr>
+            <p:cNvSpPr txBox="1"/>
+            <p:nvPr/>
+          </p:nvSpPr>
+          <p:spPr>
+            <a:xfrm>
+              <a:off x="872935" y="4104536"/>
+              <a:ext cx="231227" cy="338554"/>
+            </a:xfrm>
+            <a:prstGeom prst="rect">
+              <a:avLst/>
+            </a:prstGeom>
+            <a:noFill/>
+          </p:spPr>
+          <p:txBody>
+            <a:bodyPr wrap="square" rtlCol="0">
+              <a:spAutoFit/>
+            </a:bodyPr>
+            <a:lstStyle/>
+            <a:p>
+              <a:r>
+                <a:rPr lang="en-US" sz="1600" b="1" dirty="0">
+                  <a:solidFill>
+                    <a:schemeClr val="bg1"/>
+                  </a:solidFill>
+                  <a:latin typeface="Helvetica" panose="020B0604020202020204" pitchFamily="34" charset="0"/>
+                  <a:cs typeface="Helvetica" panose="020B0604020202020204" pitchFamily="34" charset="0"/>
+                </a:rPr>
+                <a:t>8</a:t>
+              </a:r>
+            </a:p>
+          </p:txBody>
+        </p:sp>
+        <p:sp>
+          <p:nvSpPr>
+            <p:cNvPr id="7" name="TextBox 6">
+              <a:extLst>
+                <a:ext uri="{FF2B5EF4-FFF2-40B4-BE49-F238E27FC236}">
+                  <a16:creationId xmlns:a16="http://schemas.microsoft.com/office/drawing/2014/main" id="{931783B5-DED4-489B-8529-28E16B55547A}"/>
+                </a:ext>
+              </a:extLst>
+            </p:cNvPr>
+            <p:cNvSpPr txBox="1"/>
+            <p:nvPr/>
+          </p:nvSpPr>
+          <p:spPr>
+            <a:xfrm>
+              <a:off x="1114063" y="4104536"/>
+              <a:ext cx="520071" cy="338554"/>
+            </a:xfrm>
+            <a:prstGeom prst="rect">
+              <a:avLst/>
+            </a:prstGeom>
+            <a:noFill/>
+          </p:spPr>
+          <p:txBody>
+            <a:bodyPr wrap="square" rtlCol="0">
+              <a:spAutoFit/>
+            </a:bodyPr>
+            <a:lstStyle/>
+            <a:p>
+              <a:r>
+                <a:rPr lang="en-US" sz="1600" b="1" dirty="0">
+                  <a:solidFill>
+                    <a:schemeClr val="bg1"/>
+                  </a:solidFill>
+                  <a:latin typeface="Helvetica" panose="020B0604020202020204" pitchFamily="34" charset="0"/>
+                  <a:cs typeface="Helvetica" panose="020B0604020202020204" pitchFamily="34" charset="0"/>
+                </a:rPr>
+                <a:t>20</a:t>
+              </a:r>
+            </a:p>
+          </p:txBody>
+        </p:sp>
+        <p:sp>
+          <p:nvSpPr>
+            <p:cNvPr id="8" name="TextBox 7">
+              <a:extLst>
+                <a:ext uri="{FF2B5EF4-FFF2-40B4-BE49-F238E27FC236}">
+                  <a16:creationId xmlns:a16="http://schemas.microsoft.com/office/drawing/2014/main" id="{DEA295A5-4A8E-4035-B6BE-55D06B4B137A}"/>
+                </a:ext>
+              </a:extLst>
+            </p:cNvPr>
+            <p:cNvSpPr txBox="1"/>
+            <p:nvPr/>
+          </p:nvSpPr>
+          <p:spPr>
+            <a:xfrm>
+              <a:off x="1455152" y="4104536"/>
+              <a:ext cx="231227" cy="338554"/>
+            </a:xfrm>
+            <a:prstGeom prst="rect">
+              <a:avLst/>
+            </a:prstGeom>
+            <a:noFill/>
+          </p:spPr>
+          <p:txBody>
+            <a:bodyPr wrap="square" rtlCol="0">
+              <a:spAutoFit/>
+            </a:bodyPr>
+            <a:lstStyle/>
+            <a:p>
+              <a:r>
+                <a:rPr lang="en-US" sz="1600" b="1" dirty="0">
+                  <a:solidFill>
+                    <a:schemeClr val="bg1"/>
+                  </a:solidFill>
+                  <a:latin typeface="Helvetica" panose="020B0604020202020204" pitchFamily="34" charset="0"/>
+                  <a:cs typeface="Helvetica" panose="020B0604020202020204" pitchFamily="34" charset="0"/>
+                </a:rPr>
+                <a:t>6</a:t>
+              </a:r>
+            </a:p>
+          </p:txBody>
+        </p:sp>
+        <p:sp>
+          <p:nvSpPr>
+            <p:cNvPr id="12" name="TextBox 11">
+              <a:extLst>
+                <a:ext uri="{FF2B5EF4-FFF2-40B4-BE49-F238E27FC236}">
+                  <a16:creationId xmlns:a16="http://schemas.microsoft.com/office/drawing/2014/main" id="{C1A22776-524D-415D-A2FD-28CC06C026CD}"/>
+                </a:ext>
+              </a:extLst>
+            </p:cNvPr>
+            <p:cNvSpPr txBox="1"/>
+            <p:nvPr/>
+          </p:nvSpPr>
+          <p:spPr>
+            <a:xfrm>
+              <a:off x="2462004" y="4104536"/>
+              <a:ext cx="231227" cy="338554"/>
+            </a:xfrm>
+            <a:prstGeom prst="rect">
+              <a:avLst/>
+            </a:prstGeom>
+            <a:noFill/>
+          </p:spPr>
+          <p:txBody>
+            <a:bodyPr wrap="square" rtlCol="0">
+              <a:spAutoFit/>
+            </a:bodyPr>
+            <a:lstStyle/>
+            <a:p>
+              <a:r>
+                <a:rPr lang="en-US" sz="1600" b="1" dirty="0">
+                  <a:solidFill>
+                    <a:schemeClr val="bg1"/>
+                  </a:solidFill>
+                  <a:latin typeface="Helvetica" panose="020B0604020202020204" pitchFamily="34" charset="0"/>
+                  <a:cs typeface="Helvetica" panose="020B0604020202020204" pitchFamily="34" charset="0"/>
+                </a:rPr>
+                <a:t>3</a:t>
+              </a:r>
+            </a:p>
+          </p:txBody>
+        </p:sp>
+        <p:sp>
+          <p:nvSpPr>
+            <p:cNvPr id="16" name="TextBox 15">
+              <a:extLst>
+                <a:ext uri="{FF2B5EF4-FFF2-40B4-BE49-F238E27FC236}">
+                  <a16:creationId xmlns:a16="http://schemas.microsoft.com/office/drawing/2014/main" id="{0905CE40-575B-4578-A6C1-E509FB6E7C48}"/>
+                </a:ext>
+              </a:extLst>
+            </p:cNvPr>
+            <p:cNvSpPr txBox="1"/>
+            <p:nvPr/>
+          </p:nvSpPr>
+          <p:spPr>
+            <a:xfrm>
+              <a:off x="4150501" y="4104536"/>
+              <a:ext cx="231227" cy="338554"/>
+            </a:xfrm>
+            <a:prstGeom prst="rect">
+              <a:avLst/>
+            </a:prstGeom>
+            <a:noFill/>
+          </p:spPr>
+          <p:txBody>
+            <a:bodyPr wrap="square" rtlCol="0">
+              <a:spAutoFit/>
+            </a:bodyPr>
+            <a:lstStyle/>
+            <a:p>
+              <a:r>
+                <a:rPr lang="en-US" sz="1600" b="1" dirty="0">
+                  <a:latin typeface="Helvetica" panose="020B0604020202020204" pitchFamily="34" charset="0"/>
+                  <a:cs typeface="Helvetica" panose="020B0604020202020204" pitchFamily="34" charset="0"/>
+                </a:rPr>
+                <a:t>5</a:t>
+              </a:r>
+            </a:p>
+          </p:txBody>
+        </p:sp>
+        <p:sp>
+          <p:nvSpPr>
+            <p:cNvPr id="21" name="TextBox 20">
+              <a:extLst>
+                <a:ext uri="{FF2B5EF4-FFF2-40B4-BE49-F238E27FC236}">
+                  <a16:creationId xmlns:a16="http://schemas.microsoft.com/office/drawing/2014/main" id="{590C613E-EB64-4B35-AA63-47B4EE25F88F}"/>
+                </a:ext>
+              </a:extLst>
+            </p:cNvPr>
+            <p:cNvSpPr txBox="1"/>
+            <p:nvPr/>
+          </p:nvSpPr>
+          <p:spPr>
+            <a:xfrm>
+              <a:off x="5451339" y="4104536"/>
+              <a:ext cx="231227" cy="338554"/>
+            </a:xfrm>
+            <a:prstGeom prst="rect">
+              <a:avLst/>
+            </a:prstGeom>
+            <a:noFill/>
+          </p:spPr>
+          <p:txBody>
+            <a:bodyPr wrap="square" rtlCol="0">
+              <a:spAutoFit/>
+            </a:bodyPr>
+            <a:lstStyle/>
+            <a:p>
+              <a:r>
+                <a:rPr lang="en-US" sz="1600" b="1" dirty="0">
+                  <a:solidFill>
+                    <a:schemeClr val="bg1"/>
+                  </a:solidFill>
+                  <a:latin typeface="Helvetica" panose="020B0604020202020204" pitchFamily="34" charset="0"/>
+                  <a:cs typeface="Helvetica" panose="020B0604020202020204" pitchFamily="34" charset="0"/>
+                </a:rPr>
+                <a:t>2</a:t>
+              </a:r>
+            </a:p>
+          </p:txBody>
+        </p:sp>
+        <p:sp>
+          <p:nvSpPr>
+            <p:cNvPr id="27" name="TextBox 26">
+              <a:extLst>
+                <a:ext uri="{FF2B5EF4-FFF2-40B4-BE49-F238E27FC236}">
+                  <a16:creationId xmlns:a16="http://schemas.microsoft.com/office/drawing/2014/main" id="{FE4C8F31-089B-4CC0-A86F-11B7B7FAAEF9}"/>
+                </a:ext>
+              </a:extLst>
+            </p:cNvPr>
+            <p:cNvSpPr txBox="1"/>
+            <p:nvPr/>
+          </p:nvSpPr>
+          <p:spPr>
+            <a:xfrm>
+              <a:off x="10559475" y="4104536"/>
+              <a:ext cx="231227" cy="338554"/>
+            </a:xfrm>
+            <a:prstGeom prst="rect">
+              <a:avLst/>
+            </a:prstGeom>
+            <a:noFill/>
+          </p:spPr>
+          <p:txBody>
+            <a:bodyPr wrap="square" rtlCol="0">
+              <a:spAutoFit/>
+            </a:bodyPr>
+            <a:lstStyle/>
+            <a:p>
+              <a:r>
+                <a:rPr lang="en-US" sz="1600" b="1" dirty="0">
+                  <a:solidFill>
+                    <a:schemeClr val="bg1"/>
+                  </a:solidFill>
+                  <a:latin typeface="Helvetica" panose="020B0604020202020204" pitchFamily="34" charset="0"/>
+                  <a:cs typeface="Helvetica" panose="020B0604020202020204" pitchFamily="34" charset="0"/>
+                </a:rPr>
+                <a:t>3</a:t>
+              </a:r>
+            </a:p>
+          </p:txBody>
+        </p:sp>
+        <p:sp>
+          <p:nvSpPr>
+            <p:cNvPr id="28" name="TextBox 27">
+              <a:extLst>
+                <a:ext uri="{FF2B5EF4-FFF2-40B4-BE49-F238E27FC236}">
+                  <a16:creationId xmlns:a16="http://schemas.microsoft.com/office/drawing/2014/main" id="{C52A1958-BC6E-43F3-9932-00FB813D720D}"/>
+                </a:ext>
+              </a:extLst>
+            </p:cNvPr>
+            <p:cNvSpPr txBox="1"/>
+            <p:nvPr/>
+          </p:nvSpPr>
+          <p:spPr>
+            <a:xfrm>
+              <a:off x="10853153" y="4104536"/>
+              <a:ext cx="231227" cy="338554"/>
+            </a:xfrm>
+            <a:prstGeom prst="rect">
+              <a:avLst/>
+            </a:prstGeom>
+            <a:noFill/>
+          </p:spPr>
+          <p:txBody>
+            <a:bodyPr wrap="square" rtlCol="0">
+              <a:spAutoFit/>
+            </a:bodyPr>
+            <a:lstStyle/>
+            <a:p>
+              <a:r>
+                <a:rPr lang="en-US" sz="1600" b="1" dirty="0">
+                  <a:solidFill>
+                    <a:schemeClr val="bg1"/>
+                  </a:solidFill>
+                  <a:latin typeface="Helvetica" panose="020B0604020202020204" pitchFamily="34" charset="0"/>
+                  <a:cs typeface="Helvetica" panose="020B0604020202020204" pitchFamily="34" charset="0"/>
+                </a:rPr>
+                <a:t>8</a:t>
+              </a:r>
+            </a:p>
+          </p:txBody>
+        </p:sp>
+        <p:sp>
+          <p:nvSpPr>
+            <p:cNvPr id="37" name="TextBox 36">
+              <a:extLst>
+                <a:ext uri="{FF2B5EF4-FFF2-40B4-BE49-F238E27FC236}">
+                  <a16:creationId xmlns:a16="http://schemas.microsoft.com/office/drawing/2014/main" id="{3113E37F-2273-4612-8E43-D89C164B513D}"/>
+                </a:ext>
+              </a:extLst>
+            </p:cNvPr>
+            <p:cNvSpPr txBox="1"/>
+            <p:nvPr/>
+          </p:nvSpPr>
+          <p:spPr>
+            <a:xfrm>
+              <a:off x="6993299" y="4104536"/>
+              <a:ext cx="231227" cy="338554"/>
+            </a:xfrm>
+            <a:prstGeom prst="rect">
+              <a:avLst/>
+            </a:prstGeom>
+            <a:noFill/>
+          </p:spPr>
+          <p:txBody>
+            <a:bodyPr wrap="square" rtlCol="0">
+              <a:spAutoFit/>
+            </a:bodyPr>
+            <a:lstStyle/>
+            <a:p>
+              <a:r>
+                <a:rPr lang="en-US" sz="1600" b="1" dirty="0">
+                  <a:solidFill>
+                    <a:schemeClr val="bg1"/>
+                  </a:solidFill>
+                  <a:latin typeface="Helvetica" panose="020B0604020202020204" pitchFamily="34" charset="0"/>
+                  <a:cs typeface="Helvetica" panose="020B0604020202020204" pitchFamily="34" charset="0"/>
+                </a:rPr>
+                <a:t>5</a:t>
+              </a:r>
+            </a:p>
+          </p:txBody>
+        </p:sp>
+      </p:grpSp>
+    </p:spTree>
+    <p:extLst>
+      <p:ext uri="{BB962C8B-B14F-4D97-AF65-F5344CB8AC3E}">
+        <p14:creationId xmlns:p14="http://schemas.microsoft.com/office/powerpoint/2010/main" val="2296122879"/>
       </p:ext>
     </p:extLst>
   </p:cSld>

</xml_diff>